<commit_message>
Add nice animation about project planing to agile presentation
</commit_message>
<xml_diff>
--- a/13_agile/agile_slides.pptx
+++ b/13_agile/agile_slides.pptx
@@ -8,9 +8,10 @@
     <p:sldId id="258" r:id="rId2"/>
     <p:sldId id="265" r:id="rId3"/>
     <p:sldId id="266" r:id="rId4"/>
-    <p:sldId id="267" r:id="rId5"/>
-    <p:sldId id="268" r:id="rId6"/>
-    <p:sldId id="269" r:id="rId7"/>
+    <p:sldId id="271" r:id="rId5"/>
+    <p:sldId id="267" r:id="rId6"/>
+    <p:sldId id="268" r:id="rId7"/>
+    <p:sldId id="269" r:id="rId8"/>
   </p:sldIdLst>
   <p:sldSz cx="12192000" cy="6858000"/>
   <p:notesSz cx="6858000" cy="9144000"/>
@@ -259,7 +260,7 @@
           <a:p>
             <a:fld id="{311397B5-8C69-41E8-80AB-B2B64B3912C3}" type="datetimeFigureOut">
               <a:rPr lang="de-DE" smtClean="0"/>
-              <a:t>07.02.2018</a:t>
+              <a:t>08.02.2018</a:t>
             </a:fld>
             <a:endParaRPr lang="de-DE"/>
           </a:p>
@@ -429,7 +430,7 @@
           <a:p>
             <a:fld id="{311397B5-8C69-41E8-80AB-B2B64B3912C3}" type="datetimeFigureOut">
               <a:rPr lang="de-DE" smtClean="0"/>
-              <a:t>07.02.2018</a:t>
+              <a:t>08.02.2018</a:t>
             </a:fld>
             <a:endParaRPr lang="de-DE"/>
           </a:p>
@@ -609,7 +610,7 @@
           <a:p>
             <a:fld id="{311397B5-8C69-41E8-80AB-B2B64B3912C3}" type="datetimeFigureOut">
               <a:rPr lang="de-DE" smtClean="0"/>
-              <a:t>07.02.2018</a:t>
+              <a:t>08.02.2018</a:t>
             </a:fld>
             <a:endParaRPr lang="de-DE"/>
           </a:p>
@@ -779,7 +780,7 @@
           <a:p>
             <a:fld id="{311397B5-8C69-41E8-80AB-B2B64B3912C3}" type="datetimeFigureOut">
               <a:rPr lang="de-DE" smtClean="0"/>
-              <a:t>07.02.2018</a:t>
+              <a:t>08.02.2018</a:t>
             </a:fld>
             <a:endParaRPr lang="de-DE"/>
           </a:p>
@@ -1025,7 +1026,7 @@
           <a:p>
             <a:fld id="{311397B5-8C69-41E8-80AB-B2B64B3912C3}" type="datetimeFigureOut">
               <a:rPr lang="de-DE" smtClean="0"/>
-              <a:t>07.02.2018</a:t>
+              <a:t>08.02.2018</a:t>
             </a:fld>
             <a:endParaRPr lang="de-DE"/>
           </a:p>
@@ -1257,7 +1258,7 @@
           <a:p>
             <a:fld id="{311397B5-8C69-41E8-80AB-B2B64B3912C3}" type="datetimeFigureOut">
               <a:rPr lang="de-DE" smtClean="0"/>
-              <a:t>07.02.2018</a:t>
+              <a:t>08.02.2018</a:t>
             </a:fld>
             <a:endParaRPr lang="de-DE"/>
           </a:p>
@@ -1624,7 +1625,7 @@
           <a:p>
             <a:fld id="{311397B5-8C69-41E8-80AB-B2B64B3912C3}" type="datetimeFigureOut">
               <a:rPr lang="de-DE" smtClean="0"/>
-              <a:t>07.02.2018</a:t>
+              <a:t>08.02.2018</a:t>
             </a:fld>
             <a:endParaRPr lang="de-DE"/>
           </a:p>
@@ -1742,7 +1743,7 @@
           <a:p>
             <a:fld id="{311397B5-8C69-41E8-80AB-B2B64B3912C3}" type="datetimeFigureOut">
               <a:rPr lang="de-DE" smtClean="0"/>
-              <a:t>07.02.2018</a:t>
+              <a:t>08.02.2018</a:t>
             </a:fld>
             <a:endParaRPr lang="de-DE"/>
           </a:p>
@@ -1837,7 +1838,7 @@
           <a:p>
             <a:fld id="{311397B5-8C69-41E8-80AB-B2B64B3912C3}" type="datetimeFigureOut">
               <a:rPr lang="de-DE" smtClean="0"/>
-              <a:t>07.02.2018</a:t>
+              <a:t>08.02.2018</a:t>
             </a:fld>
             <a:endParaRPr lang="de-DE"/>
           </a:p>
@@ -2114,7 +2115,7 @@
           <a:p>
             <a:fld id="{311397B5-8C69-41E8-80AB-B2B64B3912C3}" type="datetimeFigureOut">
               <a:rPr lang="de-DE" smtClean="0"/>
-              <a:t>07.02.2018</a:t>
+              <a:t>08.02.2018</a:t>
             </a:fld>
             <a:endParaRPr lang="de-DE"/>
           </a:p>
@@ -2367,7 +2368,7 @@
           <a:p>
             <a:fld id="{311397B5-8C69-41E8-80AB-B2B64B3912C3}" type="datetimeFigureOut">
               <a:rPr lang="de-DE" smtClean="0"/>
-              <a:t>07.02.2018</a:t>
+              <a:t>08.02.2018</a:t>
             </a:fld>
             <a:endParaRPr lang="de-DE"/>
           </a:p>
@@ -2580,7 +2581,7 @@
           <a:p>
             <a:fld id="{311397B5-8C69-41E8-80AB-B2B64B3912C3}" type="datetimeFigureOut">
               <a:rPr lang="de-DE" smtClean="0"/>
-              <a:t>07.02.2018</a:t>
+              <a:t>08.02.2018</a:t>
             </a:fld>
             <a:endParaRPr lang="de-DE"/>
           </a:p>
@@ -3014,21 +3015,8 @@
                   <a:srgbClr val="C00000"/>
                 </a:solidFill>
               </a:rPr>
-              <a:t>Chapter </a:t>
+              <a:t>Chapter 13: </a:t>
             </a:r>
-            <a:r>
-              <a:rPr lang="de-DE" sz="6000" b="1" dirty="0" smtClean="0">
-                <a:solidFill>
-                  <a:srgbClr val="C00000"/>
-                </a:solidFill>
-              </a:rPr>
-              <a:t>13: </a:t>
-            </a:r>
-            <a:endParaRPr lang="de-DE" sz="6000" b="1" dirty="0" smtClean="0">
-              <a:solidFill>
-                <a:srgbClr val="C00000"/>
-              </a:solidFill>
-            </a:endParaRPr>
           </a:p>
           <a:p>
             <a:pPr algn="ctr"/>
@@ -3125,6 +3113,13 @@
   <p:clrMapOvr>
     <a:masterClrMapping/>
   </p:clrMapOvr>
+  <p:timing>
+    <p:tnLst>
+      <p:par>
+        <p:cTn id="1" dur="indefinite" restart="never" nodeType="tmRoot"/>
+      </p:par>
+    </p:tnLst>
+  </p:timing>
 </p:sld>
 </file>
 
@@ -3185,10 +3180,3700 @@
   <p:clrMapOvr>
     <a:masterClrMapping/>
   </p:clrMapOvr>
+  <p:timing>
+    <p:tnLst>
+      <p:par>
+        <p:cTn id="1" dur="indefinite" restart="never" nodeType="tmRoot"/>
+      </p:par>
+    </p:tnLst>
+  </p:timing>
 </p:sld>
 </file>
 
 <file path=ppt/slides/slide4.xml><?xml version="1.0" encoding="utf-8"?>
+<p:sld xmlns:a="http://schemas.openxmlformats.org/drawingml/2006/main" xmlns:r="http://schemas.openxmlformats.org/officeDocument/2006/relationships" xmlns:p="http://schemas.openxmlformats.org/presentationml/2006/main">
+  <p:cSld>
+    <p:spTree>
+      <p:nvGrpSpPr>
+        <p:cNvPr id="1" name=""/>
+        <p:cNvGrpSpPr/>
+        <p:nvPr/>
+      </p:nvGrpSpPr>
+      <p:grpSpPr>
+        <a:xfrm>
+          <a:off x="0" y="0"/>
+          <a:ext cx="0" cy="0"/>
+          <a:chOff x="0" y="0"/>
+          <a:chExt cx="0" cy="0"/>
+        </a:xfrm>
+      </p:grpSpPr>
+      <p:sp>
+        <p:nvSpPr>
+          <p:cNvPr id="87" name="Kreis 86"/>
+          <p:cNvSpPr/>
+          <p:nvPr/>
+        </p:nvSpPr>
+        <p:spPr>
+          <a:xfrm rot="10800000">
+            <a:off x="2689312" y="2675645"/>
+            <a:ext cx="2182552" cy="1714358"/>
+          </a:xfrm>
+          <a:prstGeom prst="pie">
+            <a:avLst>
+              <a:gd name="adj1" fmla="val 8191490"/>
+              <a:gd name="adj2" fmla="val 13145691"/>
+            </a:avLst>
+          </a:prstGeom>
+          <a:solidFill>
+            <a:srgbClr val="FFFF00">
+              <a:alpha val="61000"/>
+            </a:srgbClr>
+          </a:solidFill>
+          <a:ln>
+            <a:noFill/>
+          </a:ln>
+          <a:effectLst/>
+        </p:spPr>
+        <p:style>
+          <a:lnRef idx="1">
+            <a:schemeClr val="accent1"/>
+          </a:lnRef>
+          <a:fillRef idx="3">
+            <a:schemeClr val="accent1"/>
+          </a:fillRef>
+          <a:effectRef idx="2">
+            <a:schemeClr val="accent1"/>
+          </a:effectRef>
+          <a:fontRef idx="minor">
+            <a:schemeClr val="lt1"/>
+          </a:fontRef>
+        </p:style>
+        <p:txBody>
+          <a:bodyPr rtlCol="0" anchor="ctr"/>
+          <a:lstStyle/>
+          <a:p>
+            <a:pPr algn="ctr"/>
+            <a:endParaRPr lang="de-DE">
+              <a:solidFill>
+                <a:schemeClr val="tx1"/>
+              </a:solidFill>
+            </a:endParaRPr>
+          </a:p>
+        </p:txBody>
+      </p:sp>
+      <p:sp>
+        <p:nvSpPr>
+          <p:cNvPr id="88" name="Kreis 87"/>
+          <p:cNvSpPr/>
+          <p:nvPr/>
+        </p:nvSpPr>
+        <p:spPr>
+          <a:xfrm rot="10800000">
+            <a:off x="3647728" y="2323826"/>
+            <a:ext cx="2182552" cy="1714358"/>
+          </a:xfrm>
+          <a:prstGeom prst="pie">
+            <a:avLst>
+              <a:gd name="adj1" fmla="val 8191490"/>
+              <a:gd name="adj2" fmla="val 13145691"/>
+            </a:avLst>
+          </a:prstGeom>
+          <a:solidFill>
+            <a:srgbClr val="FFFF00">
+              <a:alpha val="61000"/>
+            </a:srgbClr>
+          </a:solidFill>
+          <a:ln>
+            <a:noFill/>
+          </a:ln>
+          <a:effectLst/>
+        </p:spPr>
+        <p:style>
+          <a:lnRef idx="1">
+            <a:schemeClr val="accent1"/>
+          </a:lnRef>
+          <a:fillRef idx="3">
+            <a:schemeClr val="accent1"/>
+          </a:fillRef>
+          <a:effectRef idx="2">
+            <a:schemeClr val="accent1"/>
+          </a:effectRef>
+          <a:fontRef idx="minor">
+            <a:schemeClr val="lt1"/>
+          </a:fontRef>
+        </p:style>
+        <p:txBody>
+          <a:bodyPr rtlCol="0" anchor="ctr"/>
+          <a:lstStyle/>
+          <a:p>
+            <a:pPr algn="ctr"/>
+            <a:endParaRPr lang="de-DE">
+              <a:solidFill>
+                <a:schemeClr val="tx1"/>
+              </a:solidFill>
+            </a:endParaRPr>
+          </a:p>
+        </p:txBody>
+      </p:sp>
+      <p:sp>
+        <p:nvSpPr>
+          <p:cNvPr id="89" name="Kreis 88"/>
+          <p:cNvSpPr/>
+          <p:nvPr/>
+        </p:nvSpPr>
+        <p:spPr>
+          <a:xfrm rot="10800000">
+            <a:off x="4606144" y="1972007"/>
+            <a:ext cx="2182552" cy="1714358"/>
+          </a:xfrm>
+          <a:prstGeom prst="pie">
+            <a:avLst>
+              <a:gd name="adj1" fmla="val 8191490"/>
+              <a:gd name="adj2" fmla="val 13145691"/>
+            </a:avLst>
+          </a:prstGeom>
+          <a:solidFill>
+            <a:srgbClr val="FFFF00">
+              <a:alpha val="61000"/>
+            </a:srgbClr>
+          </a:solidFill>
+          <a:ln>
+            <a:noFill/>
+          </a:ln>
+          <a:effectLst/>
+        </p:spPr>
+        <p:style>
+          <a:lnRef idx="1">
+            <a:schemeClr val="accent1"/>
+          </a:lnRef>
+          <a:fillRef idx="3">
+            <a:schemeClr val="accent1"/>
+          </a:fillRef>
+          <a:effectRef idx="2">
+            <a:schemeClr val="accent1"/>
+          </a:effectRef>
+          <a:fontRef idx="minor">
+            <a:schemeClr val="lt1"/>
+          </a:fontRef>
+        </p:style>
+        <p:txBody>
+          <a:bodyPr rtlCol="0" anchor="ctr"/>
+          <a:lstStyle/>
+          <a:p>
+            <a:pPr algn="ctr"/>
+            <a:endParaRPr lang="de-DE">
+              <a:solidFill>
+                <a:schemeClr val="tx1"/>
+              </a:solidFill>
+            </a:endParaRPr>
+          </a:p>
+        </p:txBody>
+      </p:sp>
+      <p:sp>
+        <p:nvSpPr>
+          <p:cNvPr id="90" name="Kreis 89"/>
+          <p:cNvSpPr/>
+          <p:nvPr/>
+        </p:nvSpPr>
+        <p:spPr>
+          <a:xfrm rot="10800000">
+            <a:off x="5519936" y="1695693"/>
+            <a:ext cx="2182552" cy="1714358"/>
+          </a:xfrm>
+          <a:prstGeom prst="pie">
+            <a:avLst>
+              <a:gd name="adj1" fmla="val 8191490"/>
+              <a:gd name="adj2" fmla="val 13145691"/>
+            </a:avLst>
+          </a:prstGeom>
+          <a:solidFill>
+            <a:srgbClr val="FFFF00">
+              <a:alpha val="61000"/>
+            </a:srgbClr>
+          </a:solidFill>
+          <a:ln>
+            <a:noFill/>
+          </a:ln>
+          <a:effectLst/>
+        </p:spPr>
+        <p:style>
+          <a:lnRef idx="1">
+            <a:schemeClr val="accent1"/>
+          </a:lnRef>
+          <a:fillRef idx="3">
+            <a:schemeClr val="accent1"/>
+          </a:fillRef>
+          <a:effectRef idx="2">
+            <a:schemeClr val="accent1"/>
+          </a:effectRef>
+          <a:fontRef idx="minor">
+            <a:schemeClr val="lt1"/>
+          </a:fontRef>
+        </p:style>
+        <p:txBody>
+          <a:bodyPr rtlCol="0" anchor="ctr"/>
+          <a:lstStyle/>
+          <a:p>
+            <a:pPr algn="ctr"/>
+            <a:endParaRPr lang="de-DE">
+              <a:solidFill>
+                <a:schemeClr val="tx1"/>
+              </a:solidFill>
+            </a:endParaRPr>
+          </a:p>
+        </p:txBody>
+      </p:sp>
+      <p:sp>
+        <p:nvSpPr>
+          <p:cNvPr id="91" name="Kreis 90"/>
+          <p:cNvSpPr/>
+          <p:nvPr/>
+        </p:nvSpPr>
+        <p:spPr>
+          <a:xfrm rot="10800000">
+            <a:off x="6433728" y="1551140"/>
+            <a:ext cx="2182552" cy="1714358"/>
+          </a:xfrm>
+          <a:prstGeom prst="pie">
+            <a:avLst>
+              <a:gd name="adj1" fmla="val 8191490"/>
+              <a:gd name="adj2" fmla="val 13145691"/>
+            </a:avLst>
+          </a:prstGeom>
+          <a:solidFill>
+            <a:srgbClr val="FFFF00">
+              <a:alpha val="61000"/>
+            </a:srgbClr>
+          </a:solidFill>
+          <a:ln>
+            <a:noFill/>
+          </a:ln>
+          <a:effectLst/>
+        </p:spPr>
+        <p:style>
+          <a:lnRef idx="1">
+            <a:schemeClr val="accent1"/>
+          </a:lnRef>
+          <a:fillRef idx="3">
+            <a:schemeClr val="accent1"/>
+          </a:fillRef>
+          <a:effectRef idx="2">
+            <a:schemeClr val="accent1"/>
+          </a:effectRef>
+          <a:fontRef idx="minor">
+            <a:schemeClr val="lt1"/>
+          </a:fontRef>
+        </p:style>
+        <p:txBody>
+          <a:bodyPr rtlCol="0" anchor="ctr"/>
+          <a:lstStyle/>
+          <a:p>
+            <a:pPr algn="ctr"/>
+            <a:endParaRPr lang="de-DE">
+              <a:solidFill>
+                <a:schemeClr val="tx1"/>
+              </a:solidFill>
+            </a:endParaRPr>
+          </a:p>
+        </p:txBody>
+      </p:sp>
+      <p:grpSp>
+        <p:nvGrpSpPr>
+          <p:cNvPr id="86" name="Gruppieren 85"/>
+          <p:cNvGrpSpPr/>
+          <p:nvPr/>
+        </p:nvGrpSpPr>
+        <p:grpSpPr>
+          <a:xfrm>
+            <a:off x="1764364" y="2177487"/>
+            <a:ext cx="2391868" cy="1831344"/>
+            <a:chOff x="240364" y="2177487"/>
+            <a:chExt cx="2391868" cy="1831344"/>
+          </a:xfrm>
+        </p:grpSpPr>
+        <p:sp>
+          <p:nvSpPr>
+            <p:cNvPr id="80" name="Kreis 79"/>
+            <p:cNvSpPr/>
+            <p:nvPr/>
+          </p:nvSpPr>
+          <p:spPr>
+            <a:xfrm rot="10800000">
+              <a:off x="240364" y="2294473"/>
+              <a:ext cx="2182552" cy="1714358"/>
+            </a:xfrm>
+            <a:prstGeom prst="pie">
+              <a:avLst>
+                <a:gd name="adj1" fmla="val 8191490"/>
+                <a:gd name="adj2" fmla="val 13145691"/>
+              </a:avLst>
+            </a:prstGeom>
+            <a:solidFill>
+              <a:srgbClr val="FFFF00">
+                <a:alpha val="61000"/>
+              </a:srgbClr>
+            </a:solidFill>
+            <a:ln>
+              <a:noFill/>
+            </a:ln>
+            <a:effectLst/>
+          </p:spPr>
+          <p:style>
+            <a:lnRef idx="1">
+              <a:schemeClr val="accent1"/>
+            </a:lnRef>
+            <a:fillRef idx="3">
+              <a:schemeClr val="accent1"/>
+            </a:fillRef>
+            <a:effectRef idx="2">
+              <a:schemeClr val="accent1"/>
+            </a:effectRef>
+            <a:fontRef idx="minor">
+              <a:schemeClr val="lt1"/>
+            </a:fontRef>
+          </p:style>
+          <p:txBody>
+            <a:bodyPr rtlCol="0" anchor="ctr"/>
+            <a:lstStyle/>
+            <a:p>
+              <a:pPr algn="ctr"/>
+              <a:endParaRPr lang="de-DE">
+                <a:solidFill>
+                  <a:schemeClr val="tx1"/>
+                </a:solidFill>
+              </a:endParaRPr>
+            </a:p>
+          </p:txBody>
+        </p:sp>
+        <p:sp>
+          <p:nvSpPr>
+            <p:cNvPr id="85" name="Textfeld 84"/>
+            <p:cNvSpPr txBox="1"/>
+            <p:nvPr/>
+          </p:nvSpPr>
+          <p:spPr>
+            <a:xfrm>
+              <a:off x="1503205" y="2177487"/>
+              <a:ext cx="1129027" cy="461665"/>
+            </a:xfrm>
+            <a:prstGeom prst="rect">
+              <a:avLst/>
+            </a:prstGeom>
+            <a:solidFill>
+              <a:schemeClr val="bg1">
+                <a:alpha val="69000"/>
+              </a:schemeClr>
+            </a:solidFill>
+          </p:spPr>
+          <p:txBody>
+            <a:bodyPr wrap="none" rtlCol="0">
+              <a:spAutoFit/>
+            </a:bodyPr>
+            <a:lstStyle>
+              <a:defPPr>
+                <a:defRPr lang="de-DE"/>
+              </a:defPPr>
+              <a:lvl1pPr>
+                <a:defRPr sz="1200">
+                  <a:solidFill>
+                    <a:srgbClr val="000000"/>
+                  </a:solidFill>
+                </a:defRPr>
+              </a:lvl1pPr>
+            </a:lstStyle>
+            <a:p>
+              <a:r>
+                <a:rPr lang="de-DE" dirty="0"/>
+                <a:t>Entscheidungs-</a:t>
+              </a:r>
+            </a:p>
+            <a:p>
+              <a:r>
+                <a:rPr lang="de-DE" dirty="0" err="1"/>
+                <a:t>spielraum</a:t>
+              </a:r>
+              <a:endParaRPr lang="de-DE" dirty="0"/>
+            </a:p>
+          </p:txBody>
+        </p:sp>
+      </p:grpSp>
+      <p:sp>
+        <p:nvSpPr>
+          <p:cNvPr id="6" name="Titel 5"/>
+          <p:cNvSpPr>
+            <a:spLocks noGrp="1"/>
+          </p:cNvSpPr>
+          <p:nvPr>
+            <p:ph type="title"/>
+          </p:nvPr>
+        </p:nvSpPr>
+        <p:spPr>
+          <a:xfrm>
+            <a:off x="1524003" y="430122"/>
+            <a:ext cx="2121369" cy="338554"/>
+          </a:xfrm>
+        </p:spPr>
+        <p:txBody>
+          <a:bodyPr>
+            <a:normAutofit fontScale="90000"/>
+          </a:bodyPr>
+          <a:lstStyle/>
+          <a:p>
+            <a:r>
+              <a:rPr lang="de-DE" dirty="0" smtClean="0"/>
+              <a:t>Fahren auf Sicht</a:t>
+            </a:r>
+            <a:endParaRPr lang="de-DE" dirty="0"/>
+          </a:p>
+        </p:txBody>
+      </p:sp>
+      <p:sp>
+        <p:nvSpPr>
+          <p:cNvPr id="2" name="Datumsplatzhalter 1"/>
+          <p:cNvSpPr>
+            <a:spLocks noGrp="1"/>
+          </p:cNvSpPr>
+          <p:nvPr>
+            <p:ph type="dt" sz="half" idx="10"/>
+          </p:nvPr>
+        </p:nvSpPr>
+        <p:spPr/>
+        <p:txBody>
+          <a:bodyPr/>
+          <a:lstStyle/>
+          <a:p>
+            <a:r>
+              <a:rPr lang="de-DE" smtClean="0"/>
+              <a:t>© msg systems ag, ScrumStarterkit V1.1</a:t>
+            </a:r>
+            <a:endParaRPr lang="de-DE"/>
+          </a:p>
+        </p:txBody>
+      </p:sp>
+      <p:sp>
+        <p:nvSpPr>
+          <p:cNvPr id="4" name="Foliennummernplatzhalter 3"/>
+          <p:cNvSpPr>
+            <a:spLocks noGrp="1"/>
+          </p:cNvSpPr>
+          <p:nvPr>
+            <p:ph type="sldNum" sz="quarter" idx="11"/>
+          </p:nvPr>
+        </p:nvSpPr>
+        <p:spPr/>
+        <p:txBody>
+          <a:bodyPr/>
+          <a:lstStyle/>
+          <a:p>
+            <a:fld id="{88CA36CA-16E3-4509-8B56-49FD6E26A41E}" type="slidenum">
+              <a:rPr lang="de-DE" smtClean="0"/>
+              <a:pPr/>
+              <a:t>4</a:t>
+            </a:fld>
+            <a:endParaRPr lang="de-DE" dirty="0"/>
+          </a:p>
+        </p:txBody>
+      </p:sp>
+      <p:sp>
+        <p:nvSpPr>
+          <p:cNvPr id="3" name="Fußzeilenplatzhalter 2"/>
+          <p:cNvSpPr>
+            <a:spLocks noGrp="1"/>
+          </p:cNvSpPr>
+          <p:nvPr>
+            <p:ph type="ftr" sz="quarter" idx="12"/>
+          </p:nvPr>
+        </p:nvSpPr>
+        <p:spPr/>
+        <p:txBody>
+          <a:bodyPr/>
+          <a:lstStyle/>
+          <a:p>
+            <a:r>
+              <a:rPr lang="en-US" smtClean="0"/>
+              <a:t>Applied Technology Research (XT)</a:t>
+            </a:r>
+            <a:endParaRPr lang="de-DE" dirty="0"/>
+          </a:p>
+        </p:txBody>
+      </p:sp>
+      <p:cxnSp>
+        <p:nvCxnSpPr>
+          <p:cNvPr id="9" name="Gerade Verbindung 8"/>
+          <p:cNvCxnSpPr/>
+          <p:nvPr/>
+        </p:nvCxnSpPr>
+        <p:spPr>
+          <a:xfrm>
+            <a:off x="2855640" y="1567477"/>
+            <a:ext cx="0" cy="3168352"/>
+          </a:xfrm>
+          <a:prstGeom prst="line">
+            <a:avLst/>
+          </a:prstGeom>
+          <a:ln w="28575"/>
+        </p:spPr>
+        <p:style>
+          <a:lnRef idx="1">
+            <a:schemeClr val="accent1"/>
+          </a:lnRef>
+          <a:fillRef idx="0">
+            <a:schemeClr val="accent1"/>
+          </a:fillRef>
+          <a:effectRef idx="0">
+            <a:schemeClr val="accent1"/>
+          </a:effectRef>
+          <a:fontRef idx="minor">
+            <a:schemeClr val="tx1"/>
+          </a:fontRef>
+        </p:style>
+      </p:cxnSp>
+      <p:cxnSp>
+        <p:nvCxnSpPr>
+          <p:cNvPr id="10" name="Gerade Verbindung 9"/>
+          <p:cNvCxnSpPr/>
+          <p:nvPr/>
+        </p:nvCxnSpPr>
+        <p:spPr>
+          <a:xfrm>
+            <a:off x="3791744" y="1567477"/>
+            <a:ext cx="0" cy="3168352"/>
+          </a:xfrm>
+          <a:prstGeom prst="line">
+            <a:avLst/>
+          </a:prstGeom>
+          <a:ln w="28575"/>
+        </p:spPr>
+        <p:style>
+          <a:lnRef idx="1">
+            <a:schemeClr val="accent1"/>
+          </a:lnRef>
+          <a:fillRef idx="0">
+            <a:schemeClr val="accent1"/>
+          </a:fillRef>
+          <a:effectRef idx="0">
+            <a:schemeClr val="accent1"/>
+          </a:effectRef>
+          <a:fontRef idx="minor">
+            <a:schemeClr val="tx1"/>
+          </a:fontRef>
+        </p:style>
+      </p:cxnSp>
+      <p:cxnSp>
+        <p:nvCxnSpPr>
+          <p:cNvPr id="11" name="Gerade Verbindung 10"/>
+          <p:cNvCxnSpPr/>
+          <p:nvPr/>
+        </p:nvCxnSpPr>
+        <p:spPr>
+          <a:xfrm>
+            <a:off x="4727848" y="1567477"/>
+            <a:ext cx="0" cy="3168352"/>
+          </a:xfrm>
+          <a:prstGeom prst="line">
+            <a:avLst/>
+          </a:prstGeom>
+          <a:ln w="28575"/>
+        </p:spPr>
+        <p:style>
+          <a:lnRef idx="1">
+            <a:schemeClr val="accent1"/>
+          </a:lnRef>
+          <a:fillRef idx="0">
+            <a:schemeClr val="accent1"/>
+          </a:fillRef>
+          <a:effectRef idx="0">
+            <a:schemeClr val="accent1"/>
+          </a:effectRef>
+          <a:fontRef idx="minor">
+            <a:schemeClr val="tx1"/>
+          </a:fontRef>
+        </p:style>
+      </p:cxnSp>
+      <p:cxnSp>
+        <p:nvCxnSpPr>
+          <p:cNvPr id="12" name="Gerade Verbindung 11"/>
+          <p:cNvCxnSpPr/>
+          <p:nvPr/>
+        </p:nvCxnSpPr>
+        <p:spPr>
+          <a:xfrm>
+            <a:off x="5663952" y="1567477"/>
+            <a:ext cx="0" cy="3168352"/>
+          </a:xfrm>
+          <a:prstGeom prst="line">
+            <a:avLst/>
+          </a:prstGeom>
+          <a:ln w="28575"/>
+        </p:spPr>
+        <p:style>
+          <a:lnRef idx="1">
+            <a:schemeClr val="accent1"/>
+          </a:lnRef>
+          <a:fillRef idx="0">
+            <a:schemeClr val="accent1"/>
+          </a:fillRef>
+          <a:effectRef idx="0">
+            <a:schemeClr val="accent1"/>
+          </a:effectRef>
+          <a:fontRef idx="minor">
+            <a:schemeClr val="tx1"/>
+          </a:fontRef>
+        </p:style>
+      </p:cxnSp>
+      <p:cxnSp>
+        <p:nvCxnSpPr>
+          <p:cNvPr id="13" name="Gerade Verbindung 12"/>
+          <p:cNvCxnSpPr/>
+          <p:nvPr/>
+        </p:nvCxnSpPr>
+        <p:spPr>
+          <a:xfrm>
+            <a:off x="6600056" y="1567477"/>
+            <a:ext cx="0" cy="3168352"/>
+          </a:xfrm>
+          <a:prstGeom prst="line">
+            <a:avLst/>
+          </a:prstGeom>
+          <a:ln w="28575"/>
+        </p:spPr>
+        <p:style>
+          <a:lnRef idx="1">
+            <a:schemeClr val="accent1"/>
+          </a:lnRef>
+          <a:fillRef idx="0">
+            <a:schemeClr val="accent1"/>
+          </a:fillRef>
+          <a:effectRef idx="0">
+            <a:schemeClr val="accent1"/>
+          </a:effectRef>
+          <a:fontRef idx="minor">
+            <a:schemeClr val="tx1"/>
+          </a:fontRef>
+        </p:style>
+      </p:cxnSp>
+      <p:cxnSp>
+        <p:nvCxnSpPr>
+          <p:cNvPr id="14" name="Gerade Verbindung 13"/>
+          <p:cNvCxnSpPr/>
+          <p:nvPr/>
+        </p:nvCxnSpPr>
+        <p:spPr>
+          <a:xfrm>
+            <a:off x="7536160" y="1567477"/>
+            <a:ext cx="0" cy="3168352"/>
+          </a:xfrm>
+          <a:prstGeom prst="line">
+            <a:avLst/>
+          </a:prstGeom>
+          <a:ln w="28575"/>
+        </p:spPr>
+        <p:style>
+          <a:lnRef idx="1">
+            <a:schemeClr val="accent1"/>
+          </a:lnRef>
+          <a:fillRef idx="0">
+            <a:schemeClr val="accent1"/>
+          </a:fillRef>
+          <a:effectRef idx="0">
+            <a:schemeClr val="accent1"/>
+          </a:effectRef>
+          <a:fontRef idx="minor">
+            <a:schemeClr val="tx1"/>
+          </a:fontRef>
+        </p:style>
+      </p:cxnSp>
+      <p:cxnSp>
+        <p:nvCxnSpPr>
+          <p:cNvPr id="15" name="Gerade Verbindung 14"/>
+          <p:cNvCxnSpPr/>
+          <p:nvPr/>
+        </p:nvCxnSpPr>
+        <p:spPr>
+          <a:xfrm>
+            <a:off x="8472264" y="1567477"/>
+            <a:ext cx="0" cy="3168352"/>
+          </a:xfrm>
+          <a:prstGeom prst="line">
+            <a:avLst/>
+          </a:prstGeom>
+          <a:ln w="28575"/>
+        </p:spPr>
+        <p:style>
+          <a:lnRef idx="1">
+            <a:schemeClr val="accent1"/>
+          </a:lnRef>
+          <a:fillRef idx="0">
+            <a:schemeClr val="accent1"/>
+          </a:fillRef>
+          <a:effectRef idx="0">
+            <a:schemeClr val="accent1"/>
+          </a:effectRef>
+          <a:fontRef idx="minor">
+            <a:schemeClr val="tx1"/>
+          </a:fontRef>
+        </p:style>
+      </p:cxnSp>
+      <p:sp>
+        <p:nvSpPr>
+          <p:cNvPr id="7" name="Ellipse 6"/>
+          <p:cNvSpPr/>
+          <p:nvPr/>
+        </p:nvSpPr>
+        <p:spPr>
+          <a:xfrm>
+            <a:off x="2711624" y="3007637"/>
+            <a:ext cx="288032" cy="288032"/>
+          </a:xfrm>
+          <a:prstGeom prst="ellipse">
+            <a:avLst/>
+          </a:prstGeom>
+          <a:solidFill>
+            <a:srgbClr val="C00000"/>
+          </a:solidFill>
+          <a:ln>
+            <a:noFill/>
+          </a:ln>
+          <a:effectLst>
+            <a:outerShdw blurRad="50800" dist="38100" dir="5400000" algn="t" rotWithShape="0">
+              <a:prstClr val="black">
+                <a:alpha val="40000"/>
+              </a:prstClr>
+            </a:outerShdw>
+          </a:effectLst>
+        </p:spPr>
+        <p:style>
+          <a:lnRef idx="1">
+            <a:schemeClr val="accent1"/>
+          </a:lnRef>
+          <a:fillRef idx="3">
+            <a:schemeClr val="accent1"/>
+          </a:fillRef>
+          <a:effectRef idx="2">
+            <a:schemeClr val="accent1"/>
+          </a:effectRef>
+          <a:fontRef idx="minor">
+            <a:schemeClr val="lt1"/>
+          </a:fontRef>
+        </p:style>
+        <p:txBody>
+          <a:bodyPr rtlCol="0" anchor="ctr"/>
+          <a:lstStyle/>
+          <a:p>
+            <a:pPr algn="ctr"/>
+            <a:endParaRPr lang="de-DE"/>
+          </a:p>
+        </p:txBody>
+      </p:sp>
+      <p:grpSp>
+        <p:nvGrpSpPr>
+          <p:cNvPr id="43" name="Gruppieren 42"/>
+          <p:cNvGrpSpPr/>
+          <p:nvPr/>
+        </p:nvGrpSpPr>
+        <p:grpSpPr>
+          <a:xfrm>
+            <a:off x="2999656" y="3151655"/>
+            <a:ext cx="4680520" cy="1285459"/>
+            <a:chOff x="1475656" y="3151653"/>
+            <a:chExt cx="4680520" cy="1285459"/>
+          </a:xfrm>
+        </p:grpSpPr>
+        <p:sp>
+          <p:nvSpPr>
+            <p:cNvPr id="24" name="Ellipse 23"/>
+            <p:cNvSpPr/>
+            <p:nvPr/>
+          </p:nvSpPr>
+          <p:spPr>
+            <a:xfrm>
+              <a:off x="5868144" y="4149080"/>
+              <a:ext cx="288032" cy="288032"/>
+            </a:xfrm>
+            <a:prstGeom prst="ellipse">
+              <a:avLst/>
+            </a:prstGeom>
+            <a:solidFill>
+              <a:schemeClr val="bg1">
+                <a:lumMod val="65000"/>
+              </a:schemeClr>
+            </a:solidFill>
+            <a:ln>
+              <a:noFill/>
+            </a:ln>
+            <a:effectLst>
+              <a:outerShdw blurRad="50800" dist="38100" dir="5400000" algn="t" rotWithShape="0">
+                <a:prstClr val="black">
+                  <a:alpha val="40000"/>
+                </a:prstClr>
+              </a:outerShdw>
+            </a:effectLst>
+          </p:spPr>
+          <p:style>
+            <a:lnRef idx="1">
+              <a:schemeClr val="accent1"/>
+            </a:lnRef>
+            <a:fillRef idx="3">
+              <a:schemeClr val="accent1"/>
+            </a:fillRef>
+            <a:effectRef idx="2">
+              <a:schemeClr val="accent1"/>
+            </a:effectRef>
+            <a:fontRef idx="minor">
+              <a:schemeClr val="lt1"/>
+            </a:fontRef>
+          </p:style>
+          <p:txBody>
+            <a:bodyPr rtlCol="0" anchor="ctr"/>
+            <a:lstStyle/>
+            <a:p>
+              <a:pPr algn="ctr"/>
+              <a:endParaRPr lang="de-DE"/>
+            </a:p>
+          </p:txBody>
+        </p:sp>
+        <p:cxnSp>
+          <p:nvCxnSpPr>
+            <p:cNvPr id="26" name="Gerade Verbindung mit Pfeil 25"/>
+            <p:cNvCxnSpPr>
+              <a:stCxn id="7" idx="6"/>
+              <a:endCxn id="24" idx="2"/>
+            </p:cNvCxnSpPr>
+            <p:nvPr/>
+          </p:nvCxnSpPr>
+          <p:spPr>
+            <a:xfrm>
+              <a:off x="1475656" y="3151653"/>
+              <a:ext cx="4392488" cy="1141443"/>
+            </a:xfrm>
+            <a:prstGeom prst="straightConnector1">
+              <a:avLst/>
+            </a:prstGeom>
+            <a:ln>
+              <a:tailEnd type="arrow"/>
+            </a:ln>
+          </p:spPr>
+          <p:style>
+            <a:lnRef idx="1">
+              <a:schemeClr val="accent1"/>
+            </a:lnRef>
+            <a:fillRef idx="0">
+              <a:schemeClr val="accent1"/>
+            </a:fillRef>
+            <a:effectRef idx="0">
+              <a:schemeClr val="accent1"/>
+            </a:effectRef>
+            <a:fontRef idx="minor">
+              <a:schemeClr val="tx1"/>
+            </a:fontRef>
+          </p:style>
+        </p:cxnSp>
+      </p:grpSp>
+      <p:grpSp>
+        <p:nvGrpSpPr>
+          <p:cNvPr id="44" name="Gruppieren 43"/>
+          <p:cNvGrpSpPr/>
+          <p:nvPr/>
+        </p:nvGrpSpPr>
+        <p:grpSpPr>
+          <a:xfrm>
+            <a:off x="3935760" y="3532824"/>
+            <a:ext cx="3744416" cy="476008"/>
+            <a:chOff x="2411760" y="3532824"/>
+            <a:chExt cx="3744416" cy="476008"/>
+          </a:xfrm>
+        </p:grpSpPr>
+        <p:sp>
+          <p:nvSpPr>
+            <p:cNvPr id="28" name="Ellipse 27"/>
+            <p:cNvSpPr/>
+            <p:nvPr/>
+          </p:nvSpPr>
+          <p:spPr>
+            <a:xfrm>
+              <a:off x="5868144" y="3720800"/>
+              <a:ext cx="288032" cy="288032"/>
+            </a:xfrm>
+            <a:prstGeom prst="ellipse">
+              <a:avLst/>
+            </a:prstGeom>
+            <a:solidFill>
+              <a:schemeClr val="bg1">
+                <a:lumMod val="65000"/>
+              </a:schemeClr>
+            </a:solidFill>
+            <a:ln>
+              <a:noFill/>
+            </a:ln>
+            <a:effectLst>
+              <a:outerShdw blurRad="50800" dist="38100" dir="5400000" algn="t" rotWithShape="0">
+                <a:prstClr val="black">
+                  <a:alpha val="40000"/>
+                </a:prstClr>
+              </a:outerShdw>
+            </a:effectLst>
+          </p:spPr>
+          <p:style>
+            <a:lnRef idx="1">
+              <a:schemeClr val="accent1"/>
+            </a:lnRef>
+            <a:fillRef idx="3">
+              <a:schemeClr val="accent1"/>
+            </a:fillRef>
+            <a:effectRef idx="2">
+              <a:schemeClr val="accent1"/>
+            </a:effectRef>
+            <a:fontRef idx="minor">
+              <a:schemeClr val="lt1"/>
+            </a:fontRef>
+          </p:style>
+          <p:txBody>
+            <a:bodyPr rtlCol="0" anchor="ctr"/>
+            <a:lstStyle/>
+            <a:p>
+              <a:pPr algn="ctr"/>
+              <a:endParaRPr lang="de-DE"/>
+            </a:p>
+          </p:txBody>
+        </p:sp>
+        <p:cxnSp>
+          <p:nvCxnSpPr>
+            <p:cNvPr id="30" name="Gerade Verbindung mit Pfeil 29"/>
+            <p:cNvCxnSpPr>
+              <a:stCxn id="18" idx="6"/>
+              <a:endCxn id="28" idx="2"/>
+            </p:cNvCxnSpPr>
+            <p:nvPr/>
+          </p:nvCxnSpPr>
+          <p:spPr>
+            <a:xfrm>
+              <a:off x="2411760" y="3532824"/>
+              <a:ext cx="3456384" cy="331992"/>
+            </a:xfrm>
+            <a:prstGeom prst="straightConnector1">
+              <a:avLst/>
+            </a:prstGeom>
+            <a:ln>
+              <a:tailEnd type="arrow"/>
+            </a:ln>
+          </p:spPr>
+          <p:style>
+            <a:lnRef idx="1">
+              <a:schemeClr val="accent1"/>
+            </a:lnRef>
+            <a:fillRef idx="0">
+              <a:schemeClr val="accent1"/>
+            </a:fillRef>
+            <a:effectRef idx="0">
+              <a:schemeClr val="accent1"/>
+            </a:effectRef>
+            <a:fontRef idx="minor">
+              <a:schemeClr val="tx1"/>
+            </a:fontRef>
+          </p:style>
+        </p:cxnSp>
+      </p:grpSp>
+      <p:grpSp>
+        <p:nvGrpSpPr>
+          <p:cNvPr id="45" name="Gruppieren 44"/>
+          <p:cNvGrpSpPr/>
+          <p:nvPr/>
+        </p:nvGrpSpPr>
+        <p:grpSpPr>
+          <a:xfrm>
+            <a:off x="4871866" y="3187132"/>
+            <a:ext cx="3140095" cy="561716"/>
+            <a:chOff x="3347864" y="3187132"/>
+            <a:chExt cx="3140095" cy="561716"/>
+          </a:xfrm>
+        </p:grpSpPr>
+        <p:sp>
+          <p:nvSpPr>
+            <p:cNvPr id="31" name="Ellipse 30"/>
+            <p:cNvSpPr/>
+            <p:nvPr/>
+          </p:nvSpPr>
+          <p:spPr>
+            <a:xfrm>
+              <a:off x="6199927" y="3460816"/>
+              <a:ext cx="288032" cy="288032"/>
+            </a:xfrm>
+            <a:prstGeom prst="ellipse">
+              <a:avLst/>
+            </a:prstGeom>
+            <a:solidFill>
+              <a:schemeClr val="bg1">
+                <a:lumMod val="65000"/>
+              </a:schemeClr>
+            </a:solidFill>
+            <a:ln>
+              <a:noFill/>
+            </a:ln>
+            <a:effectLst>
+              <a:outerShdw blurRad="50800" dist="38100" dir="5400000" algn="t" rotWithShape="0">
+                <a:prstClr val="black">
+                  <a:alpha val="40000"/>
+                </a:prstClr>
+              </a:outerShdw>
+            </a:effectLst>
+          </p:spPr>
+          <p:style>
+            <a:lnRef idx="1">
+              <a:schemeClr val="accent1"/>
+            </a:lnRef>
+            <a:fillRef idx="3">
+              <a:schemeClr val="accent1"/>
+            </a:fillRef>
+            <a:effectRef idx="2">
+              <a:schemeClr val="accent1"/>
+            </a:effectRef>
+            <a:fontRef idx="minor">
+              <a:schemeClr val="lt1"/>
+            </a:fontRef>
+          </p:style>
+          <p:txBody>
+            <a:bodyPr rtlCol="0" anchor="ctr"/>
+            <a:lstStyle/>
+            <a:p>
+              <a:pPr algn="ctr"/>
+              <a:endParaRPr lang="de-DE"/>
+            </a:p>
+          </p:txBody>
+        </p:sp>
+        <p:cxnSp>
+          <p:nvCxnSpPr>
+            <p:cNvPr id="33" name="Gerade Verbindung mit Pfeil 32"/>
+            <p:cNvCxnSpPr>
+              <a:stCxn id="19" idx="6"/>
+              <a:endCxn id="31" idx="2"/>
+            </p:cNvCxnSpPr>
+            <p:nvPr/>
+          </p:nvCxnSpPr>
+          <p:spPr>
+            <a:xfrm>
+              <a:off x="3347864" y="3187132"/>
+              <a:ext cx="2852063" cy="417700"/>
+            </a:xfrm>
+            <a:prstGeom prst="straightConnector1">
+              <a:avLst/>
+            </a:prstGeom>
+            <a:ln>
+              <a:tailEnd type="arrow"/>
+            </a:ln>
+          </p:spPr>
+          <p:style>
+            <a:lnRef idx="1">
+              <a:schemeClr val="accent1"/>
+            </a:lnRef>
+            <a:fillRef idx="0">
+              <a:schemeClr val="accent1"/>
+            </a:fillRef>
+            <a:effectRef idx="0">
+              <a:schemeClr val="accent1"/>
+            </a:effectRef>
+            <a:fontRef idx="minor">
+              <a:schemeClr val="tx1"/>
+            </a:fontRef>
+          </p:style>
+        </p:cxnSp>
+      </p:grpSp>
+      <p:grpSp>
+        <p:nvGrpSpPr>
+          <p:cNvPr id="46" name="Gruppieren 45"/>
+          <p:cNvGrpSpPr/>
+          <p:nvPr/>
+        </p:nvGrpSpPr>
+        <p:grpSpPr>
+          <a:xfrm>
+            <a:off x="5807968" y="2841442"/>
+            <a:ext cx="2520280" cy="608357"/>
+            <a:chOff x="4283968" y="2841440"/>
+            <a:chExt cx="2520280" cy="608357"/>
+          </a:xfrm>
+        </p:grpSpPr>
+        <p:sp>
+          <p:nvSpPr>
+            <p:cNvPr id="34" name="Ellipse 33"/>
+            <p:cNvSpPr/>
+            <p:nvPr/>
+          </p:nvSpPr>
+          <p:spPr>
+            <a:xfrm>
+              <a:off x="6516216" y="3161765"/>
+              <a:ext cx="288032" cy="288032"/>
+            </a:xfrm>
+            <a:prstGeom prst="ellipse">
+              <a:avLst/>
+            </a:prstGeom>
+            <a:solidFill>
+              <a:schemeClr val="bg1">
+                <a:lumMod val="65000"/>
+              </a:schemeClr>
+            </a:solidFill>
+            <a:ln>
+              <a:noFill/>
+            </a:ln>
+            <a:effectLst>
+              <a:outerShdw blurRad="50800" dist="38100" dir="5400000" algn="t" rotWithShape="0">
+                <a:prstClr val="black">
+                  <a:alpha val="40000"/>
+                </a:prstClr>
+              </a:outerShdw>
+            </a:effectLst>
+          </p:spPr>
+          <p:style>
+            <a:lnRef idx="1">
+              <a:schemeClr val="accent1"/>
+            </a:lnRef>
+            <a:fillRef idx="3">
+              <a:schemeClr val="accent1"/>
+            </a:fillRef>
+            <a:effectRef idx="2">
+              <a:schemeClr val="accent1"/>
+            </a:effectRef>
+            <a:fontRef idx="minor">
+              <a:schemeClr val="lt1"/>
+            </a:fontRef>
+          </p:style>
+          <p:txBody>
+            <a:bodyPr rtlCol="0" anchor="ctr"/>
+            <a:lstStyle/>
+            <a:p>
+              <a:pPr algn="ctr"/>
+              <a:endParaRPr lang="de-DE"/>
+            </a:p>
+          </p:txBody>
+        </p:sp>
+        <p:cxnSp>
+          <p:nvCxnSpPr>
+            <p:cNvPr id="36" name="Gerade Verbindung mit Pfeil 35"/>
+            <p:cNvCxnSpPr>
+              <a:stCxn id="20" idx="6"/>
+              <a:endCxn id="34" idx="2"/>
+            </p:cNvCxnSpPr>
+            <p:nvPr/>
+          </p:nvCxnSpPr>
+          <p:spPr>
+            <a:xfrm>
+              <a:off x="4283968" y="2841440"/>
+              <a:ext cx="2232248" cy="464341"/>
+            </a:xfrm>
+            <a:prstGeom prst="straightConnector1">
+              <a:avLst/>
+            </a:prstGeom>
+            <a:ln>
+              <a:tailEnd type="arrow"/>
+            </a:ln>
+          </p:spPr>
+          <p:style>
+            <a:lnRef idx="1">
+              <a:schemeClr val="accent1"/>
+            </a:lnRef>
+            <a:fillRef idx="0">
+              <a:schemeClr val="accent1"/>
+            </a:fillRef>
+            <a:effectRef idx="0">
+              <a:schemeClr val="accent1"/>
+            </a:effectRef>
+            <a:fontRef idx="minor">
+              <a:schemeClr val="tx1"/>
+            </a:fontRef>
+          </p:style>
+        </p:cxnSp>
+      </p:grpSp>
+      <p:grpSp>
+        <p:nvGrpSpPr>
+          <p:cNvPr id="47" name="Gruppieren 46"/>
+          <p:cNvGrpSpPr/>
+          <p:nvPr/>
+        </p:nvGrpSpPr>
+        <p:grpSpPr>
+          <a:xfrm>
+            <a:off x="6744072" y="2552874"/>
+            <a:ext cx="1872208" cy="628133"/>
+            <a:chOff x="5220072" y="2552872"/>
+            <a:chExt cx="1872208" cy="628133"/>
+          </a:xfrm>
+        </p:grpSpPr>
+        <p:sp>
+          <p:nvSpPr>
+            <p:cNvPr id="37" name="Ellipse 36"/>
+            <p:cNvSpPr/>
+            <p:nvPr/>
+          </p:nvSpPr>
+          <p:spPr>
+            <a:xfrm>
+              <a:off x="6804248" y="2892973"/>
+              <a:ext cx="288032" cy="288032"/>
+            </a:xfrm>
+            <a:prstGeom prst="ellipse">
+              <a:avLst/>
+            </a:prstGeom>
+            <a:solidFill>
+              <a:schemeClr val="bg1">
+                <a:lumMod val="65000"/>
+              </a:schemeClr>
+            </a:solidFill>
+            <a:ln>
+              <a:noFill/>
+            </a:ln>
+            <a:effectLst>
+              <a:outerShdw blurRad="50800" dist="38100" dir="5400000" algn="t" rotWithShape="0">
+                <a:prstClr val="black">
+                  <a:alpha val="40000"/>
+                </a:prstClr>
+              </a:outerShdw>
+            </a:effectLst>
+          </p:spPr>
+          <p:style>
+            <a:lnRef idx="1">
+              <a:schemeClr val="accent1"/>
+            </a:lnRef>
+            <a:fillRef idx="3">
+              <a:schemeClr val="accent1"/>
+            </a:fillRef>
+            <a:effectRef idx="2">
+              <a:schemeClr val="accent1"/>
+            </a:effectRef>
+            <a:fontRef idx="minor">
+              <a:schemeClr val="lt1"/>
+            </a:fontRef>
+          </p:style>
+          <p:txBody>
+            <a:bodyPr rtlCol="0" anchor="ctr"/>
+            <a:lstStyle/>
+            <a:p>
+              <a:pPr algn="ctr"/>
+              <a:endParaRPr lang="de-DE"/>
+            </a:p>
+          </p:txBody>
+        </p:sp>
+        <p:cxnSp>
+          <p:nvCxnSpPr>
+            <p:cNvPr id="39" name="Gerade Verbindung mit Pfeil 38"/>
+            <p:cNvCxnSpPr>
+              <a:stCxn id="21" idx="6"/>
+              <a:endCxn id="37" idx="2"/>
+            </p:cNvCxnSpPr>
+            <p:nvPr/>
+          </p:nvCxnSpPr>
+          <p:spPr>
+            <a:xfrm>
+              <a:off x="5220072" y="2552872"/>
+              <a:ext cx="1584176" cy="484117"/>
+            </a:xfrm>
+            <a:prstGeom prst="straightConnector1">
+              <a:avLst/>
+            </a:prstGeom>
+            <a:ln>
+              <a:tailEnd type="arrow"/>
+            </a:ln>
+          </p:spPr>
+          <p:style>
+            <a:lnRef idx="1">
+              <a:schemeClr val="accent1"/>
+            </a:lnRef>
+            <a:fillRef idx="0">
+              <a:schemeClr val="accent1"/>
+            </a:fillRef>
+            <a:effectRef idx="0">
+              <a:schemeClr val="accent1"/>
+            </a:effectRef>
+            <a:fontRef idx="minor">
+              <a:schemeClr val="tx1"/>
+            </a:fontRef>
+          </p:style>
+        </p:cxnSp>
+      </p:grpSp>
+      <p:grpSp>
+        <p:nvGrpSpPr>
+          <p:cNvPr id="48" name="Gruppieren 47"/>
+          <p:cNvGrpSpPr/>
+          <p:nvPr/>
+        </p:nvGrpSpPr>
+        <p:grpSpPr>
+          <a:xfrm>
+            <a:off x="7680176" y="2408320"/>
+            <a:ext cx="936104" cy="386610"/>
+            <a:chOff x="6156176" y="2408320"/>
+            <a:chExt cx="936104" cy="386610"/>
+          </a:xfrm>
+        </p:grpSpPr>
+        <p:sp>
+          <p:nvSpPr>
+            <p:cNvPr id="40" name="Ellipse 39"/>
+            <p:cNvSpPr/>
+            <p:nvPr/>
+          </p:nvSpPr>
+          <p:spPr>
+            <a:xfrm>
+              <a:off x="6804248" y="2506898"/>
+              <a:ext cx="288032" cy="288032"/>
+            </a:xfrm>
+            <a:prstGeom prst="ellipse">
+              <a:avLst/>
+            </a:prstGeom>
+            <a:solidFill>
+              <a:schemeClr val="bg1">
+                <a:lumMod val="65000"/>
+              </a:schemeClr>
+            </a:solidFill>
+            <a:ln>
+              <a:noFill/>
+            </a:ln>
+            <a:effectLst>
+              <a:outerShdw blurRad="50800" dist="38100" dir="5400000" algn="t" rotWithShape="0">
+                <a:prstClr val="black">
+                  <a:alpha val="40000"/>
+                </a:prstClr>
+              </a:outerShdw>
+            </a:effectLst>
+          </p:spPr>
+          <p:style>
+            <a:lnRef idx="1">
+              <a:schemeClr val="accent1"/>
+            </a:lnRef>
+            <a:fillRef idx="3">
+              <a:schemeClr val="accent1"/>
+            </a:fillRef>
+            <a:effectRef idx="2">
+              <a:schemeClr val="accent1"/>
+            </a:effectRef>
+            <a:fontRef idx="minor">
+              <a:schemeClr val="lt1"/>
+            </a:fontRef>
+          </p:style>
+          <p:txBody>
+            <a:bodyPr rtlCol="0" anchor="ctr"/>
+            <a:lstStyle/>
+            <a:p>
+              <a:pPr algn="ctr"/>
+              <a:endParaRPr lang="de-DE"/>
+            </a:p>
+          </p:txBody>
+        </p:sp>
+        <p:cxnSp>
+          <p:nvCxnSpPr>
+            <p:cNvPr id="42" name="Gerade Verbindung mit Pfeil 41"/>
+            <p:cNvCxnSpPr>
+              <a:stCxn id="22" idx="6"/>
+              <a:endCxn id="40" idx="2"/>
+            </p:cNvCxnSpPr>
+            <p:nvPr/>
+          </p:nvCxnSpPr>
+          <p:spPr>
+            <a:xfrm>
+              <a:off x="6156176" y="2408320"/>
+              <a:ext cx="648072" cy="242594"/>
+            </a:xfrm>
+            <a:prstGeom prst="straightConnector1">
+              <a:avLst/>
+            </a:prstGeom>
+            <a:ln>
+              <a:tailEnd type="arrow"/>
+            </a:ln>
+          </p:spPr>
+          <p:style>
+            <a:lnRef idx="1">
+              <a:schemeClr val="accent1"/>
+            </a:lnRef>
+            <a:fillRef idx="0">
+              <a:schemeClr val="accent1"/>
+            </a:fillRef>
+            <a:effectRef idx="0">
+              <a:schemeClr val="accent1"/>
+            </a:effectRef>
+            <a:fontRef idx="minor">
+              <a:schemeClr val="tx1"/>
+            </a:fontRef>
+          </p:style>
+        </p:cxnSp>
+      </p:grpSp>
+      <p:grpSp>
+        <p:nvGrpSpPr>
+          <p:cNvPr id="100" name="Gruppieren 99"/>
+          <p:cNvGrpSpPr/>
+          <p:nvPr/>
+        </p:nvGrpSpPr>
+        <p:grpSpPr>
+          <a:xfrm>
+            <a:off x="2999656" y="3151655"/>
+            <a:ext cx="936104" cy="525187"/>
+            <a:chOff x="1475656" y="3151653"/>
+            <a:chExt cx="936104" cy="525187"/>
+          </a:xfrm>
+        </p:grpSpPr>
+        <p:sp>
+          <p:nvSpPr>
+            <p:cNvPr id="18" name="Ellipse 17"/>
+            <p:cNvSpPr/>
+            <p:nvPr/>
+          </p:nvSpPr>
+          <p:spPr>
+            <a:xfrm>
+              <a:off x="2123728" y="3388808"/>
+              <a:ext cx="288032" cy="288032"/>
+            </a:xfrm>
+            <a:prstGeom prst="ellipse">
+              <a:avLst/>
+            </a:prstGeom>
+            <a:solidFill>
+              <a:srgbClr val="C00000"/>
+            </a:solidFill>
+            <a:ln>
+              <a:noFill/>
+            </a:ln>
+            <a:effectLst>
+              <a:outerShdw blurRad="50800" dist="38100" dir="5400000" algn="t" rotWithShape="0">
+                <a:prstClr val="black">
+                  <a:alpha val="40000"/>
+                </a:prstClr>
+              </a:outerShdw>
+            </a:effectLst>
+          </p:spPr>
+          <p:style>
+            <a:lnRef idx="1">
+              <a:schemeClr val="accent1"/>
+            </a:lnRef>
+            <a:fillRef idx="3">
+              <a:schemeClr val="accent1"/>
+            </a:fillRef>
+            <a:effectRef idx="2">
+              <a:schemeClr val="accent1"/>
+            </a:effectRef>
+            <a:fontRef idx="minor">
+              <a:schemeClr val="lt1"/>
+            </a:fontRef>
+          </p:style>
+          <p:txBody>
+            <a:bodyPr rtlCol="0" anchor="ctr"/>
+            <a:lstStyle/>
+            <a:p>
+              <a:pPr algn="ctr"/>
+              <a:endParaRPr lang="de-DE"/>
+            </a:p>
+          </p:txBody>
+        </p:sp>
+        <p:cxnSp>
+          <p:nvCxnSpPr>
+            <p:cNvPr id="50" name="Gerade Verbindung mit Pfeil 49"/>
+            <p:cNvCxnSpPr>
+              <a:stCxn id="7" idx="6"/>
+              <a:endCxn id="18" idx="2"/>
+            </p:cNvCxnSpPr>
+            <p:nvPr/>
+          </p:nvCxnSpPr>
+          <p:spPr>
+            <a:xfrm>
+              <a:off x="1475656" y="3151653"/>
+              <a:ext cx="648072" cy="381171"/>
+            </a:xfrm>
+            <a:prstGeom prst="straightConnector1">
+              <a:avLst/>
+            </a:prstGeom>
+            <a:ln w="38100">
+              <a:tailEnd type="arrow"/>
+            </a:ln>
+          </p:spPr>
+          <p:style>
+            <a:lnRef idx="1">
+              <a:schemeClr val="accent1"/>
+            </a:lnRef>
+            <a:fillRef idx="0">
+              <a:schemeClr val="accent1"/>
+            </a:fillRef>
+            <a:effectRef idx="0">
+              <a:schemeClr val="accent1"/>
+            </a:effectRef>
+            <a:fontRef idx="minor">
+              <a:schemeClr val="tx1"/>
+            </a:fontRef>
+          </p:style>
+        </p:cxnSp>
+      </p:grpSp>
+      <p:grpSp>
+        <p:nvGrpSpPr>
+          <p:cNvPr id="102" name="Gruppieren 101"/>
+          <p:cNvGrpSpPr/>
+          <p:nvPr/>
+        </p:nvGrpSpPr>
+        <p:grpSpPr>
+          <a:xfrm>
+            <a:off x="4871864" y="2697424"/>
+            <a:ext cx="936104" cy="489708"/>
+            <a:chOff x="3347864" y="2697424"/>
+            <a:chExt cx="936104" cy="489708"/>
+          </a:xfrm>
+        </p:grpSpPr>
+        <p:sp>
+          <p:nvSpPr>
+            <p:cNvPr id="20" name="Ellipse 19"/>
+            <p:cNvSpPr/>
+            <p:nvPr/>
+          </p:nvSpPr>
+          <p:spPr>
+            <a:xfrm>
+              <a:off x="3995936" y="2697424"/>
+              <a:ext cx="288032" cy="288032"/>
+            </a:xfrm>
+            <a:prstGeom prst="ellipse">
+              <a:avLst/>
+            </a:prstGeom>
+            <a:solidFill>
+              <a:srgbClr val="C00000"/>
+            </a:solidFill>
+            <a:ln>
+              <a:noFill/>
+            </a:ln>
+            <a:effectLst>
+              <a:outerShdw blurRad="50800" dist="38100" dir="5400000" algn="t" rotWithShape="0">
+                <a:prstClr val="black">
+                  <a:alpha val="40000"/>
+                </a:prstClr>
+              </a:outerShdw>
+            </a:effectLst>
+          </p:spPr>
+          <p:style>
+            <a:lnRef idx="1">
+              <a:schemeClr val="accent1"/>
+            </a:lnRef>
+            <a:fillRef idx="3">
+              <a:schemeClr val="accent1"/>
+            </a:fillRef>
+            <a:effectRef idx="2">
+              <a:schemeClr val="accent1"/>
+            </a:effectRef>
+            <a:fontRef idx="minor">
+              <a:schemeClr val="lt1"/>
+            </a:fontRef>
+          </p:style>
+          <p:txBody>
+            <a:bodyPr rtlCol="0" anchor="ctr"/>
+            <a:lstStyle/>
+            <a:p>
+              <a:pPr algn="ctr"/>
+              <a:endParaRPr lang="de-DE"/>
+            </a:p>
+          </p:txBody>
+        </p:sp>
+        <p:cxnSp>
+          <p:nvCxnSpPr>
+            <p:cNvPr id="55" name="Gerade Verbindung mit Pfeil 54"/>
+            <p:cNvCxnSpPr>
+              <a:stCxn id="19" idx="6"/>
+              <a:endCxn id="20" idx="2"/>
+            </p:cNvCxnSpPr>
+            <p:nvPr/>
+          </p:nvCxnSpPr>
+          <p:spPr>
+            <a:xfrm flipV="1">
+              <a:off x="3347864" y="2841440"/>
+              <a:ext cx="648072" cy="345692"/>
+            </a:xfrm>
+            <a:prstGeom prst="straightConnector1">
+              <a:avLst/>
+            </a:prstGeom>
+            <a:ln w="38100">
+              <a:tailEnd type="arrow"/>
+            </a:ln>
+          </p:spPr>
+          <p:style>
+            <a:lnRef idx="1">
+              <a:schemeClr val="accent1"/>
+            </a:lnRef>
+            <a:fillRef idx="0">
+              <a:schemeClr val="accent1"/>
+            </a:fillRef>
+            <a:effectRef idx="0">
+              <a:schemeClr val="accent1"/>
+            </a:effectRef>
+            <a:fontRef idx="minor">
+              <a:schemeClr val="tx1"/>
+            </a:fontRef>
+          </p:style>
+        </p:cxnSp>
+      </p:grpSp>
+      <p:grpSp>
+        <p:nvGrpSpPr>
+          <p:cNvPr id="103" name="Gruppieren 102"/>
+          <p:cNvGrpSpPr/>
+          <p:nvPr/>
+        </p:nvGrpSpPr>
+        <p:grpSpPr>
+          <a:xfrm>
+            <a:off x="5807968" y="2408856"/>
+            <a:ext cx="936104" cy="432584"/>
+            <a:chOff x="4283968" y="2408856"/>
+            <a:chExt cx="936104" cy="432584"/>
+          </a:xfrm>
+        </p:grpSpPr>
+        <p:sp>
+          <p:nvSpPr>
+            <p:cNvPr id="21" name="Ellipse 20"/>
+            <p:cNvSpPr/>
+            <p:nvPr/>
+          </p:nvSpPr>
+          <p:spPr>
+            <a:xfrm>
+              <a:off x="4932040" y="2408856"/>
+              <a:ext cx="288032" cy="288032"/>
+            </a:xfrm>
+            <a:prstGeom prst="ellipse">
+              <a:avLst/>
+            </a:prstGeom>
+            <a:solidFill>
+              <a:srgbClr val="C00000"/>
+            </a:solidFill>
+            <a:ln>
+              <a:noFill/>
+            </a:ln>
+            <a:effectLst>
+              <a:outerShdw blurRad="50800" dist="38100" dir="5400000" algn="t" rotWithShape="0">
+                <a:prstClr val="black">
+                  <a:alpha val="40000"/>
+                </a:prstClr>
+              </a:outerShdw>
+            </a:effectLst>
+          </p:spPr>
+          <p:style>
+            <a:lnRef idx="1">
+              <a:schemeClr val="accent1"/>
+            </a:lnRef>
+            <a:fillRef idx="3">
+              <a:schemeClr val="accent1"/>
+            </a:fillRef>
+            <a:effectRef idx="2">
+              <a:schemeClr val="accent1"/>
+            </a:effectRef>
+            <a:fontRef idx="minor">
+              <a:schemeClr val="lt1"/>
+            </a:fontRef>
+          </p:style>
+          <p:txBody>
+            <a:bodyPr rtlCol="0" anchor="ctr"/>
+            <a:lstStyle/>
+            <a:p>
+              <a:pPr algn="ctr"/>
+              <a:endParaRPr lang="de-DE"/>
+            </a:p>
+          </p:txBody>
+        </p:sp>
+        <p:cxnSp>
+          <p:nvCxnSpPr>
+            <p:cNvPr id="58" name="Gerade Verbindung mit Pfeil 57"/>
+            <p:cNvCxnSpPr>
+              <a:stCxn id="20" idx="6"/>
+              <a:endCxn id="21" idx="2"/>
+            </p:cNvCxnSpPr>
+            <p:nvPr/>
+          </p:nvCxnSpPr>
+          <p:spPr>
+            <a:xfrm flipV="1">
+              <a:off x="4283968" y="2552872"/>
+              <a:ext cx="648072" cy="288568"/>
+            </a:xfrm>
+            <a:prstGeom prst="straightConnector1">
+              <a:avLst/>
+            </a:prstGeom>
+            <a:ln w="38100">
+              <a:tailEnd type="arrow"/>
+            </a:ln>
+          </p:spPr>
+          <p:style>
+            <a:lnRef idx="1">
+              <a:schemeClr val="accent1"/>
+            </a:lnRef>
+            <a:fillRef idx="0">
+              <a:schemeClr val="accent1"/>
+            </a:fillRef>
+            <a:effectRef idx="0">
+              <a:schemeClr val="accent1"/>
+            </a:effectRef>
+            <a:fontRef idx="minor">
+              <a:schemeClr val="tx1"/>
+            </a:fontRef>
+          </p:style>
+        </p:cxnSp>
+      </p:grpSp>
+      <p:grpSp>
+        <p:nvGrpSpPr>
+          <p:cNvPr id="104" name="Gruppieren 103"/>
+          <p:cNvGrpSpPr/>
+          <p:nvPr/>
+        </p:nvGrpSpPr>
+        <p:grpSpPr>
+          <a:xfrm>
+            <a:off x="6744072" y="2264304"/>
+            <a:ext cx="936104" cy="288568"/>
+            <a:chOff x="5220072" y="2264304"/>
+            <a:chExt cx="936104" cy="288568"/>
+          </a:xfrm>
+        </p:grpSpPr>
+        <p:sp>
+          <p:nvSpPr>
+            <p:cNvPr id="22" name="Ellipse 21"/>
+            <p:cNvSpPr/>
+            <p:nvPr/>
+          </p:nvSpPr>
+          <p:spPr>
+            <a:xfrm>
+              <a:off x="5868144" y="2264304"/>
+              <a:ext cx="288032" cy="288032"/>
+            </a:xfrm>
+            <a:prstGeom prst="ellipse">
+              <a:avLst/>
+            </a:prstGeom>
+            <a:solidFill>
+              <a:srgbClr val="C00000"/>
+            </a:solidFill>
+            <a:ln>
+              <a:noFill/>
+            </a:ln>
+            <a:effectLst>
+              <a:outerShdw blurRad="50800" dist="38100" dir="5400000" algn="t" rotWithShape="0">
+                <a:prstClr val="black">
+                  <a:alpha val="40000"/>
+                </a:prstClr>
+              </a:outerShdw>
+            </a:effectLst>
+          </p:spPr>
+          <p:style>
+            <a:lnRef idx="1">
+              <a:schemeClr val="accent1"/>
+            </a:lnRef>
+            <a:fillRef idx="3">
+              <a:schemeClr val="accent1"/>
+            </a:fillRef>
+            <a:effectRef idx="2">
+              <a:schemeClr val="accent1"/>
+            </a:effectRef>
+            <a:fontRef idx="minor">
+              <a:schemeClr val="lt1"/>
+            </a:fontRef>
+          </p:style>
+          <p:txBody>
+            <a:bodyPr rtlCol="0" anchor="ctr"/>
+            <a:lstStyle/>
+            <a:p>
+              <a:pPr algn="ctr"/>
+              <a:endParaRPr lang="de-DE"/>
+            </a:p>
+          </p:txBody>
+        </p:sp>
+        <p:cxnSp>
+          <p:nvCxnSpPr>
+            <p:cNvPr id="61" name="Gerade Verbindung mit Pfeil 60"/>
+            <p:cNvCxnSpPr>
+              <a:stCxn id="21" idx="6"/>
+              <a:endCxn id="22" idx="2"/>
+            </p:cNvCxnSpPr>
+            <p:nvPr/>
+          </p:nvCxnSpPr>
+          <p:spPr>
+            <a:xfrm flipV="1">
+              <a:off x="5220072" y="2408320"/>
+              <a:ext cx="648072" cy="144552"/>
+            </a:xfrm>
+            <a:prstGeom prst="straightConnector1">
+              <a:avLst/>
+            </a:prstGeom>
+            <a:ln w="38100">
+              <a:tailEnd type="arrow"/>
+            </a:ln>
+          </p:spPr>
+          <p:style>
+            <a:lnRef idx="1">
+              <a:schemeClr val="accent1"/>
+            </a:lnRef>
+            <a:fillRef idx="0">
+              <a:schemeClr val="accent1"/>
+            </a:fillRef>
+            <a:effectRef idx="0">
+              <a:schemeClr val="accent1"/>
+            </a:effectRef>
+            <a:fontRef idx="minor">
+              <a:schemeClr val="tx1"/>
+            </a:fontRef>
+          </p:style>
+        </p:cxnSp>
+      </p:grpSp>
+      <p:sp>
+        <p:nvSpPr>
+          <p:cNvPr id="70" name="Textfeld 69"/>
+          <p:cNvSpPr txBox="1"/>
+          <p:nvPr/>
+        </p:nvSpPr>
+        <p:spPr>
+          <a:xfrm>
+            <a:off x="2498813" y="4735831"/>
+            <a:ext cx="678327" cy="461665"/>
+          </a:xfrm>
+          <a:prstGeom prst="rect">
+            <a:avLst/>
+          </a:prstGeom>
+          <a:noFill/>
+        </p:spPr>
+        <p:txBody>
+          <a:bodyPr wrap="none" rtlCol="0">
+            <a:spAutoFit/>
+          </a:bodyPr>
+          <a:lstStyle/>
+          <a:p>
+            <a:r>
+              <a:rPr lang="de-DE" sz="1200" dirty="0">
+                <a:solidFill>
+                  <a:srgbClr val="000000"/>
+                </a:solidFill>
+              </a:rPr>
+              <a:t>Projekt-</a:t>
+            </a:r>
+          </a:p>
+          <a:p>
+            <a:r>
+              <a:rPr lang="de-DE" sz="1200" dirty="0">
+                <a:solidFill>
+                  <a:srgbClr val="000000"/>
+                </a:solidFill>
+              </a:rPr>
+              <a:t>beginn</a:t>
+            </a:r>
+          </a:p>
+        </p:txBody>
+      </p:sp>
+      <p:cxnSp>
+        <p:nvCxnSpPr>
+          <p:cNvPr id="72" name="Gerade Verbindung mit Pfeil 71"/>
+          <p:cNvCxnSpPr/>
+          <p:nvPr/>
+        </p:nvCxnSpPr>
+        <p:spPr>
+          <a:xfrm>
+            <a:off x="2855640" y="4504996"/>
+            <a:ext cx="936104" cy="0"/>
+          </a:xfrm>
+          <a:prstGeom prst="straightConnector1">
+            <a:avLst/>
+          </a:prstGeom>
+          <a:ln>
+            <a:headEnd type="arrow" w="med" len="med"/>
+            <a:tailEnd type="arrow" w="med" len="med"/>
+          </a:ln>
+        </p:spPr>
+        <p:style>
+          <a:lnRef idx="1">
+            <a:schemeClr val="accent1"/>
+          </a:lnRef>
+          <a:fillRef idx="0">
+            <a:schemeClr val="accent1"/>
+          </a:fillRef>
+          <a:effectRef idx="0">
+            <a:schemeClr val="accent1"/>
+          </a:effectRef>
+          <a:fontRef idx="minor">
+            <a:schemeClr val="tx1"/>
+          </a:fontRef>
+        </p:style>
+      </p:cxnSp>
+      <p:sp>
+        <p:nvSpPr>
+          <p:cNvPr id="73" name="Textfeld 72"/>
+          <p:cNvSpPr txBox="1"/>
+          <p:nvPr/>
+        </p:nvSpPr>
+        <p:spPr>
+          <a:xfrm>
+            <a:off x="3071666" y="4293098"/>
+            <a:ext cx="553549" cy="276999"/>
+          </a:xfrm>
+          <a:prstGeom prst="rect">
+            <a:avLst/>
+          </a:prstGeom>
+          <a:noFill/>
+        </p:spPr>
+        <p:txBody>
+          <a:bodyPr wrap="none" rtlCol="0">
+            <a:spAutoFit/>
+          </a:bodyPr>
+          <a:lstStyle/>
+          <a:p>
+            <a:r>
+              <a:rPr lang="de-DE" sz="1200" dirty="0">
+                <a:solidFill>
+                  <a:srgbClr val="000000"/>
+                </a:solidFill>
+              </a:rPr>
+              <a:t>Sprint</a:t>
+            </a:r>
+          </a:p>
+        </p:txBody>
+      </p:sp>
+      <p:grpSp>
+        <p:nvGrpSpPr>
+          <p:cNvPr id="108" name="Gruppieren 107"/>
+          <p:cNvGrpSpPr/>
+          <p:nvPr/>
+        </p:nvGrpSpPr>
+        <p:grpSpPr>
+          <a:xfrm>
+            <a:off x="7068110" y="1196752"/>
+            <a:ext cx="3152641" cy="4104456"/>
+            <a:chOff x="5544108" y="1196752"/>
+            <a:chExt cx="3152641" cy="4104456"/>
+          </a:xfrm>
+        </p:grpSpPr>
+        <p:grpSp>
+          <p:nvGrpSpPr>
+            <p:cNvPr id="107" name="Gruppieren 106"/>
+            <p:cNvGrpSpPr/>
+            <p:nvPr/>
+          </p:nvGrpSpPr>
+          <p:grpSpPr>
+            <a:xfrm>
+              <a:off x="5544108" y="1196752"/>
+              <a:ext cx="3152641" cy="4104456"/>
+              <a:chOff x="5544108" y="1196752"/>
+              <a:chExt cx="3152641" cy="4104456"/>
+            </a:xfrm>
+          </p:grpSpPr>
+          <p:sp>
+            <p:nvSpPr>
+              <p:cNvPr id="69" name="Ellipse 68"/>
+              <p:cNvSpPr/>
+              <p:nvPr/>
+            </p:nvSpPr>
+            <p:spPr>
+              <a:xfrm>
+                <a:off x="5544108" y="1196752"/>
+                <a:ext cx="1980220" cy="4104456"/>
+              </a:xfrm>
+              <a:prstGeom prst="ellipse">
+                <a:avLst/>
+              </a:prstGeom>
+              <a:solidFill>
+                <a:srgbClr val="841439">
+                  <a:alpha val="23000"/>
+                </a:srgbClr>
+              </a:solidFill>
+              <a:ln>
+                <a:noFill/>
+              </a:ln>
+              <a:effectLst/>
+            </p:spPr>
+            <p:style>
+              <a:lnRef idx="1">
+                <a:schemeClr val="accent1"/>
+              </a:lnRef>
+              <a:fillRef idx="3">
+                <a:schemeClr val="accent1"/>
+              </a:fillRef>
+              <a:effectRef idx="2">
+                <a:schemeClr val="accent1"/>
+              </a:effectRef>
+              <a:fontRef idx="minor">
+                <a:schemeClr val="lt1"/>
+              </a:fontRef>
+            </p:style>
+            <p:txBody>
+              <a:bodyPr rtlCol="0" anchor="ctr"/>
+              <a:lstStyle/>
+              <a:p>
+                <a:pPr algn="ctr"/>
+                <a:endParaRPr lang="de-DE" dirty="0"/>
+              </a:p>
+            </p:txBody>
+          </p:sp>
+          <p:sp>
+            <p:nvSpPr>
+              <p:cNvPr id="75" name="Textfeld 74"/>
+              <p:cNvSpPr txBox="1"/>
+              <p:nvPr/>
+            </p:nvSpPr>
+            <p:spPr>
+              <a:xfrm>
+                <a:off x="7879538" y="3211132"/>
+                <a:ext cx="817211" cy="276999"/>
+              </a:xfrm>
+              <a:prstGeom prst="rect">
+                <a:avLst/>
+              </a:prstGeom>
+              <a:noFill/>
+            </p:spPr>
+            <p:txBody>
+              <a:bodyPr wrap="none" rtlCol="0">
+                <a:spAutoFit/>
+              </a:bodyPr>
+              <a:lstStyle/>
+              <a:p>
+                <a:r>
+                  <a:rPr lang="de-DE" sz="1200" dirty="0">
+                    <a:solidFill>
+                      <a:srgbClr val="000000"/>
+                    </a:solidFill>
+                  </a:rPr>
+                  <a:t>Unschärfe</a:t>
+                </a:r>
+              </a:p>
+            </p:txBody>
+          </p:sp>
+        </p:grpSp>
+        <p:cxnSp>
+          <p:nvCxnSpPr>
+            <p:cNvPr id="78" name="Gerade Verbindung mit Pfeil 77"/>
+            <p:cNvCxnSpPr>
+              <a:endCxn id="69" idx="6"/>
+            </p:cNvCxnSpPr>
+            <p:nvPr/>
+          </p:nvCxnSpPr>
+          <p:spPr>
+            <a:xfrm flipH="1" flipV="1">
+              <a:off x="7524328" y="3248980"/>
+              <a:ext cx="356828" cy="82168"/>
+            </a:xfrm>
+            <a:prstGeom prst="straightConnector1">
+              <a:avLst/>
+            </a:prstGeom>
+            <a:ln>
+              <a:tailEnd type="arrow"/>
+            </a:ln>
+          </p:spPr>
+          <p:style>
+            <a:lnRef idx="1">
+              <a:schemeClr val="accent1"/>
+            </a:lnRef>
+            <a:fillRef idx="0">
+              <a:schemeClr val="accent1"/>
+            </a:fillRef>
+            <a:effectRef idx="0">
+              <a:schemeClr val="accent1"/>
+            </a:effectRef>
+            <a:fontRef idx="minor">
+              <a:schemeClr val="tx1"/>
+            </a:fontRef>
+          </p:style>
+        </p:cxnSp>
+      </p:grpSp>
+      <p:grpSp>
+        <p:nvGrpSpPr>
+          <p:cNvPr id="105" name="Gruppieren 104"/>
+          <p:cNvGrpSpPr/>
+          <p:nvPr/>
+        </p:nvGrpSpPr>
+        <p:grpSpPr>
+          <a:xfrm>
+            <a:off x="7680177" y="1695695"/>
+            <a:ext cx="2094368" cy="712627"/>
+            <a:chOff x="6156176" y="1695693"/>
+            <a:chExt cx="2094368" cy="712627"/>
+          </a:xfrm>
+        </p:grpSpPr>
+        <p:sp>
+          <p:nvSpPr>
+            <p:cNvPr id="23" name="Ellipse 22"/>
+            <p:cNvSpPr/>
+            <p:nvPr/>
+          </p:nvSpPr>
+          <p:spPr>
+            <a:xfrm>
+              <a:off x="6673336" y="1844824"/>
+              <a:ext cx="549856" cy="549856"/>
+            </a:xfrm>
+            <a:prstGeom prst="ellipse">
+              <a:avLst/>
+            </a:prstGeom>
+            <a:solidFill>
+              <a:srgbClr val="C00000"/>
+            </a:solidFill>
+            <a:ln>
+              <a:noFill/>
+            </a:ln>
+            <a:effectLst>
+              <a:outerShdw blurRad="50800" dist="38100" dir="5400000" algn="t" rotWithShape="0">
+                <a:prstClr val="black">
+                  <a:alpha val="40000"/>
+                </a:prstClr>
+              </a:outerShdw>
+            </a:effectLst>
+          </p:spPr>
+          <p:style>
+            <a:lnRef idx="1">
+              <a:schemeClr val="accent1"/>
+            </a:lnRef>
+            <a:fillRef idx="3">
+              <a:schemeClr val="accent1"/>
+            </a:fillRef>
+            <a:effectRef idx="2">
+              <a:schemeClr val="accent1"/>
+            </a:effectRef>
+            <a:fontRef idx="minor">
+              <a:schemeClr val="lt1"/>
+            </a:fontRef>
+          </p:style>
+          <p:txBody>
+            <a:bodyPr rtlCol="0" anchor="ctr"/>
+            <a:lstStyle/>
+            <a:p>
+              <a:pPr algn="ctr"/>
+              <a:endParaRPr lang="de-DE"/>
+            </a:p>
+          </p:txBody>
+        </p:sp>
+        <p:cxnSp>
+          <p:nvCxnSpPr>
+            <p:cNvPr id="64" name="Gerade Verbindung mit Pfeil 63"/>
+            <p:cNvCxnSpPr>
+              <a:stCxn id="22" idx="6"/>
+            </p:cNvCxnSpPr>
+            <p:nvPr/>
+          </p:nvCxnSpPr>
+          <p:spPr>
+            <a:xfrm flipV="1">
+              <a:off x="6156176" y="2119753"/>
+              <a:ext cx="504056" cy="288567"/>
+            </a:xfrm>
+            <a:prstGeom prst="straightConnector1">
+              <a:avLst/>
+            </a:prstGeom>
+            <a:ln w="38100">
+              <a:tailEnd type="arrow"/>
+            </a:ln>
+          </p:spPr>
+          <p:style>
+            <a:lnRef idx="1">
+              <a:schemeClr val="accent1"/>
+            </a:lnRef>
+            <a:fillRef idx="0">
+              <a:schemeClr val="accent1"/>
+            </a:fillRef>
+            <a:effectRef idx="0">
+              <a:schemeClr val="accent1"/>
+            </a:effectRef>
+            <a:fontRef idx="minor">
+              <a:schemeClr val="tx1"/>
+            </a:fontRef>
+          </p:style>
+        </p:cxnSp>
+        <p:sp>
+          <p:nvSpPr>
+            <p:cNvPr id="92" name="Textfeld 91"/>
+            <p:cNvSpPr txBox="1"/>
+            <p:nvPr/>
+          </p:nvSpPr>
+          <p:spPr>
+            <a:xfrm>
+              <a:off x="7305092" y="1695693"/>
+              <a:ext cx="945452" cy="461665"/>
+            </a:xfrm>
+            <a:prstGeom prst="rect">
+              <a:avLst/>
+            </a:prstGeom>
+            <a:noFill/>
+          </p:spPr>
+          <p:txBody>
+            <a:bodyPr wrap="none" rtlCol="0">
+              <a:spAutoFit/>
+            </a:bodyPr>
+            <a:lstStyle/>
+            <a:p>
+              <a:r>
+                <a:rPr lang="de-DE" sz="1200" dirty="0">
+                  <a:solidFill>
+                    <a:srgbClr val="000000"/>
+                  </a:solidFill>
+                </a:rPr>
+                <a:t>Tatsächliche</a:t>
+              </a:r>
+            </a:p>
+            <a:p>
+              <a:r>
+                <a:rPr lang="de-DE" sz="1200" dirty="0">
+                  <a:solidFill>
+                    <a:srgbClr val="000000"/>
+                  </a:solidFill>
+                </a:rPr>
+                <a:t>Lösung</a:t>
+              </a:r>
+            </a:p>
+          </p:txBody>
+        </p:sp>
+      </p:grpSp>
+      <p:sp>
+        <p:nvSpPr>
+          <p:cNvPr id="74" name="Textfeld 73"/>
+          <p:cNvSpPr txBox="1"/>
+          <p:nvPr/>
+        </p:nvSpPr>
+        <p:spPr>
+          <a:xfrm>
+            <a:off x="8115437" y="4735831"/>
+            <a:ext cx="678327" cy="461665"/>
+          </a:xfrm>
+          <a:prstGeom prst="rect">
+            <a:avLst/>
+          </a:prstGeom>
+          <a:solidFill>
+            <a:schemeClr val="bg1">
+              <a:alpha val="69000"/>
+            </a:schemeClr>
+          </a:solidFill>
+        </p:spPr>
+        <p:txBody>
+          <a:bodyPr wrap="none" rtlCol="0">
+            <a:spAutoFit/>
+          </a:bodyPr>
+          <a:lstStyle>
+            <a:defPPr>
+              <a:defRPr lang="de-DE"/>
+            </a:defPPr>
+            <a:lvl1pPr>
+              <a:defRPr sz="1200">
+                <a:solidFill>
+                  <a:srgbClr val="000000"/>
+                </a:solidFill>
+              </a:defRPr>
+            </a:lvl1pPr>
+          </a:lstStyle>
+          <a:p>
+            <a:r>
+              <a:rPr lang="de-DE" dirty="0"/>
+              <a:t>Projekt-</a:t>
+            </a:r>
+          </a:p>
+          <a:p>
+            <a:r>
+              <a:rPr lang="de-DE" dirty="0"/>
+              <a:t>ende</a:t>
+            </a:r>
+          </a:p>
+        </p:txBody>
+      </p:sp>
+      <p:grpSp>
+        <p:nvGrpSpPr>
+          <p:cNvPr id="106" name="Gruppieren 105"/>
+          <p:cNvGrpSpPr/>
+          <p:nvPr/>
+        </p:nvGrpSpPr>
+        <p:grpSpPr>
+          <a:xfrm>
+            <a:off x="7921951" y="3488131"/>
+            <a:ext cx="973187" cy="838350"/>
+            <a:chOff x="6397949" y="3488131"/>
+            <a:chExt cx="973187" cy="838350"/>
+          </a:xfrm>
+        </p:grpSpPr>
+        <p:sp>
+          <p:nvSpPr>
+            <p:cNvPr id="93" name="Textfeld 92"/>
+            <p:cNvSpPr txBox="1"/>
+            <p:nvPr/>
+          </p:nvSpPr>
+          <p:spPr>
+            <a:xfrm>
+              <a:off x="6591435" y="3864816"/>
+              <a:ext cx="779701" cy="461665"/>
+            </a:xfrm>
+            <a:prstGeom prst="rect">
+              <a:avLst/>
+            </a:prstGeom>
+            <a:solidFill>
+              <a:schemeClr val="bg1">
+                <a:alpha val="69000"/>
+              </a:schemeClr>
+            </a:solidFill>
+          </p:spPr>
+          <p:txBody>
+            <a:bodyPr wrap="none" rtlCol="0">
+              <a:spAutoFit/>
+            </a:bodyPr>
+            <a:lstStyle/>
+            <a:p>
+              <a:r>
+                <a:rPr lang="de-DE" sz="1200" dirty="0">
+                  <a:solidFill>
+                    <a:srgbClr val="000000"/>
+                  </a:solidFill>
+                </a:rPr>
+                <a:t>Geplante</a:t>
+              </a:r>
+            </a:p>
+            <a:p>
+              <a:r>
+                <a:rPr lang="de-DE" sz="1200" dirty="0">
+                  <a:solidFill>
+                    <a:srgbClr val="000000"/>
+                  </a:solidFill>
+                </a:rPr>
+                <a:t>Lösungen</a:t>
+              </a:r>
+            </a:p>
+          </p:txBody>
+        </p:sp>
+        <p:cxnSp>
+          <p:nvCxnSpPr>
+            <p:cNvPr id="95" name="Gerade Verbindung mit Pfeil 94"/>
+            <p:cNvCxnSpPr/>
+            <p:nvPr/>
+          </p:nvCxnSpPr>
+          <p:spPr>
+            <a:xfrm flipH="1" flipV="1">
+              <a:off x="6804248" y="3488131"/>
+              <a:ext cx="71335" cy="376685"/>
+            </a:xfrm>
+            <a:prstGeom prst="straightConnector1">
+              <a:avLst/>
+            </a:prstGeom>
+            <a:ln>
+              <a:tailEnd type="arrow"/>
+            </a:ln>
+          </p:spPr>
+          <p:style>
+            <a:lnRef idx="1">
+              <a:schemeClr val="accent1"/>
+            </a:lnRef>
+            <a:fillRef idx="0">
+              <a:schemeClr val="accent1"/>
+            </a:fillRef>
+            <a:effectRef idx="0">
+              <a:schemeClr val="accent1"/>
+            </a:effectRef>
+            <a:fontRef idx="minor">
+              <a:schemeClr val="tx1"/>
+            </a:fontRef>
+          </p:style>
+        </p:cxnSp>
+        <p:cxnSp>
+          <p:nvCxnSpPr>
+            <p:cNvPr id="97" name="Gerade Verbindung mit Pfeil 96"/>
+            <p:cNvCxnSpPr/>
+            <p:nvPr/>
+          </p:nvCxnSpPr>
+          <p:spPr>
+            <a:xfrm flipH="1" flipV="1">
+              <a:off x="6591435" y="3676473"/>
+              <a:ext cx="212813" cy="188343"/>
+            </a:xfrm>
+            <a:prstGeom prst="straightConnector1">
+              <a:avLst/>
+            </a:prstGeom>
+            <a:ln>
+              <a:tailEnd type="arrow"/>
+            </a:ln>
+          </p:spPr>
+          <p:style>
+            <a:lnRef idx="1">
+              <a:schemeClr val="accent1"/>
+            </a:lnRef>
+            <a:fillRef idx="0">
+              <a:schemeClr val="accent1"/>
+            </a:fillRef>
+            <a:effectRef idx="0">
+              <a:schemeClr val="accent1"/>
+            </a:effectRef>
+            <a:fontRef idx="minor">
+              <a:schemeClr val="tx1"/>
+            </a:fontRef>
+          </p:style>
+        </p:cxnSp>
+        <p:cxnSp>
+          <p:nvCxnSpPr>
+            <p:cNvPr id="99" name="Gerade Verbindung mit Pfeil 98"/>
+            <p:cNvCxnSpPr/>
+            <p:nvPr/>
+          </p:nvCxnSpPr>
+          <p:spPr>
+            <a:xfrm flipH="1" flipV="1">
+              <a:off x="6397949" y="4008832"/>
+              <a:ext cx="190275" cy="86816"/>
+            </a:xfrm>
+            <a:prstGeom prst="straightConnector1">
+              <a:avLst/>
+            </a:prstGeom>
+            <a:ln>
+              <a:tailEnd type="arrow"/>
+            </a:ln>
+          </p:spPr>
+          <p:style>
+            <a:lnRef idx="1">
+              <a:schemeClr val="accent1"/>
+            </a:lnRef>
+            <a:fillRef idx="0">
+              <a:schemeClr val="accent1"/>
+            </a:fillRef>
+            <a:effectRef idx="0">
+              <a:schemeClr val="accent1"/>
+            </a:effectRef>
+            <a:fontRef idx="minor">
+              <a:schemeClr val="tx1"/>
+            </a:fontRef>
+          </p:style>
+        </p:cxnSp>
+      </p:grpSp>
+      <p:grpSp>
+        <p:nvGrpSpPr>
+          <p:cNvPr id="101" name="Gruppieren 100"/>
+          <p:cNvGrpSpPr/>
+          <p:nvPr/>
+        </p:nvGrpSpPr>
+        <p:grpSpPr>
+          <a:xfrm>
+            <a:off x="3935760" y="3043116"/>
+            <a:ext cx="936104" cy="489708"/>
+            <a:chOff x="2411760" y="3043116"/>
+            <a:chExt cx="936104" cy="489708"/>
+          </a:xfrm>
+        </p:grpSpPr>
+        <p:sp>
+          <p:nvSpPr>
+            <p:cNvPr id="19" name="Ellipse 18"/>
+            <p:cNvSpPr/>
+            <p:nvPr/>
+          </p:nvSpPr>
+          <p:spPr>
+            <a:xfrm>
+              <a:off x="3059832" y="3043116"/>
+              <a:ext cx="288032" cy="288032"/>
+            </a:xfrm>
+            <a:prstGeom prst="ellipse">
+              <a:avLst/>
+            </a:prstGeom>
+            <a:solidFill>
+              <a:srgbClr val="C00000"/>
+            </a:solidFill>
+            <a:ln>
+              <a:noFill/>
+            </a:ln>
+            <a:effectLst>
+              <a:outerShdw blurRad="50800" dist="38100" dir="5400000" algn="t" rotWithShape="0">
+                <a:prstClr val="black">
+                  <a:alpha val="40000"/>
+                </a:prstClr>
+              </a:outerShdw>
+            </a:effectLst>
+          </p:spPr>
+          <p:style>
+            <a:lnRef idx="1">
+              <a:schemeClr val="accent1"/>
+            </a:lnRef>
+            <a:fillRef idx="3">
+              <a:schemeClr val="accent1"/>
+            </a:fillRef>
+            <a:effectRef idx="2">
+              <a:schemeClr val="accent1"/>
+            </a:effectRef>
+            <a:fontRef idx="minor">
+              <a:schemeClr val="lt1"/>
+            </a:fontRef>
+          </p:style>
+          <p:txBody>
+            <a:bodyPr rtlCol="0" anchor="ctr"/>
+            <a:lstStyle/>
+            <a:p>
+              <a:pPr algn="ctr"/>
+              <a:endParaRPr lang="de-DE"/>
+            </a:p>
+          </p:txBody>
+        </p:sp>
+        <p:cxnSp>
+          <p:nvCxnSpPr>
+            <p:cNvPr id="52" name="Gerade Verbindung mit Pfeil 51"/>
+            <p:cNvCxnSpPr>
+              <a:stCxn id="18" idx="6"/>
+              <a:endCxn id="19" idx="2"/>
+            </p:cNvCxnSpPr>
+            <p:nvPr/>
+          </p:nvCxnSpPr>
+          <p:spPr>
+            <a:xfrm flipV="1">
+              <a:off x="2411760" y="3187132"/>
+              <a:ext cx="648072" cy="345692"/>
+            </a:xfrm>
+            <a:prstGeom prst="straightConnector1">
+              <a:avLst/>
+            </a:prstGeom>
+            <a:ln w="38100">
+              <a:tailEnd type="arrow"/>
+            </a:ln>
+          </p:spPr>
+          <p:style>
+            <a:lnRef idx="1">
+              <a:schemeClr val="accent1"/>
+            </a:lnRef>
+            <a:fillRef idx="0">
+              <a:schemeClr val="accent1"/>
+            </a:fillRef>
+            <a:effectRef idx="0">
+              <a:schemeClr val="accent1"/>
+            </a:effectRef>
+            <a:fontRef idx="minor">
+              <a:schemeClr val="tx1"/>
+            </a:fontRef>
+          </p:style>
+        </p:cxnSp>
+      </p:grpSp>
+    </p:spTree>
+    <p:extLst>
+      <p:ext uri="{BB962C8B-B14F-4D97-AF65-F5344CB8AC3E}">
+        <p14:creationId xmlns:p14="http://schemas.microsoft.com/office/powerpoint/2010/main" val="836042268"/>
+      </p:ext>
+    </p:extLst>
+  </p:cSld>
+  <p:clrMapOvr>
+    <a:masterClrMapping/>
+  </p:clrMapOvr>
+  <p:timing>
+    <p:tnLst>
+      <p:par>
+        <p:cTn id="1" dur="indefinite" restart="never" nodeType="tmRoot">
+          <p:childTnLst>
+            <p:seq concurrent="1" nextAc="seek">
+              <p:cTn id="2" dur="indefinite" nodeType="mainSeq">
+                <p:childTnLst>
+                  <p:par>
+                    <p:cTn id="3" fill="hold">
+                      <p:stCondLst>
+                        <p:cond delay="indefinite"/>
+                      </p:stCondLst>
+                      <p:childTnLst>
+                        <p:par>
+                          <p:cTn id="4" fill="hold">
+                            <p:stCondLst>
+                              <p:cond delay="0"/>
+                            </p:stCondLst>
+                            <p:childTnLst>
+                              <p:par>
+                                <p:cTn id="5" presetID="10" presetClass="entr" presetSubtype="0" fill="hold" grpId="0" nodeType="clickEffect">
+                                  <p:stCondLst>
+                                    <p:cond delay="0"/>
+                                  </p:stCondLst>
+                                  <p:childTnLst>
+                                    <p:set>
+                                      <p:cBhvr>
+                                        <p:cTn id="6" dur="1" fill="hold">
+                                          <p:stCondLst>
+                                            <p:cond delay="0"/>
+                                          </p:stCondLst>
+                                        </p:cTn>
+                                        <p:tgtEl>
+                                          <p:spTgt spid="7"/>
+                                        </p:tgtEl>
+                                        <p:attrNameLst>
+                                          <p:attrName>style.visibility</p:attrName>
+                                        </p:attrNameLst>
+                                      </p:cBhvr>
+                                      <p:to>
+                                        <p:strVal val="visible"/>
+                                      </p:to>
+                                    </p:set>
+                                    <p:animEffect transition="in" filter="fade">
+                                      <p:cBhvr>
+                                        <p:cTn id="7" dur="500"/>
+                                        <p:tgtEl>
+                                          <p:spTgt spid="7"/>
+                                        </p:tgtEl>
+                                      </p:cBhvr>
+                                    </p:animEffect>
+                                  </p:childTnLst>
+                                </p:cTn>
+                              </p:par>
+                            </p:childTnLst>
+                          </p:cTn>
+                        </p:par>
+                      </p:childTnLst>
+                    </p:cTn>
+                  </p:par>
+                  <p:par>
+                    <p:cTn id="8" fill="hold">
+                      <p:stCondLst>
+                        <p:cond delay="indefinite"/>
+                      </p:stCondLst>
+                      <p:childTnLst>
+                        <p:par>
+                          <p:cTn id="9" fill="hold">
+                            <p:stCondLst>
+                              <p:cond delay="0"/>
+                            </p:stCondLst>
+                            <p:childTnLst>
+                              <p:par>
+                                <p:cTn id="10" presetID="10" presetClass="entr" presetSubtype="0" fill="hold" nodeType="clickEffect">
+                                  <p:stCondLst>
+                                    <p:cond delay="0"/>
+                                  </p:stCondLst>
+                                  <p:childTnLst>
+                                    <p:set>
+                                      <p:cBhvr>
+                                        <p:cTn id="11" dur="1" fill="hold">
+                                          <p:stCondLst>
+                                            <p:cond delay="0"/>
+                                          </p:stCondLst>
+                                        </p:cTn>
+                                        <p:tgtEl>
+                                          <p:spTgt spid="43"/>
+                                        </p:tgtEl>
+                                        <p:attrNameLst>
+                                          <p:attrName>style.visibility</p:attrName>
+                                        </p:attrNameLst>
+                                      </p:cBhvr>
+                                      <p:to>
+                                        <p:strVal val="visible"/>
+                                      </p:to>
+                                    </p:set>
+                                    <p:animEffect transition="in" filter="fade">
+                                      <p:cBhvr>
+                                        <p:cTn id="12" dur="500"/>
+                                        <p:tgtEl>
+                                          <p:spTgt spid="43"/>
+                                        </p:tgtEl>
+                                      </p:cBhvr>
+                                    </p:animEffect>
+                                  </p:childTnLst>
+                                </p:cTn>
+                              </p:par>
+                            </p:childTnLst>
+                          </p:cTn>
+                        </p:par>
+                      </p:childTnLst>
+                    </p:cTn>
+                  </p:par>
+                  <p:par>
+                    <p:cTn id="13" fill="hold">
+                      <p:stCondLst>
+                        <p:cond delay="indefinite"/>
+                      </p:stCondLst>
+                      <p:childTnLst>
+                        <p:par>
+                          <p:cTn id="14" fill="hold">
+                            <p:stCondLst>
+                              <p:cond delay="0"/>
+                            </p:stCondLst>
+                            <p:childTnLst>
+                              <p:par>
+                                <p:cTn id="15" presetID="10" presetClass="entr" presetSubtype="0" fill="hold" nodeType="clickEffect">
+                                  <p:stCondLst>
+                                    <p:cond delay="0"/>
+                                  </p:stCondLst>
+                                  <p:childTnLst>
+                                    <p:set>
+                                      <p:cBhvr>
+                                        <p:cTn id="16" dur="1" fill="hold">
+                                          <p:stCondLst>
+                                            <p:cond delay="0"/>
+                                          </p:stCondLst>
+                                        </p:cTn>
+                                        <p:tgtEl>
+                                          <p:spTgt spid="86"/>
+                                        </p:tgtEl>
+                                        <p:attrNameLst>
+                                          <p:attrName>style.visibility</p:attrName>
+                                        </p:attrNameLst>
+                                      </p:cBhvr>
+                                      <p:to>
+                                        <p:strVal val="visible"/>
+                                      </p:to>
+                                    </p:set>
+                                    <p:animEffect transition="in" filter="fade">
+                                      <p:cBhvr>
+                                        <p:cTn id="17" dur="500"/>
+                                        <p:tgtEl>
+                                          <p:spTgt spid="86"/>
+                                        </p:tgtEl>
+                                      </p:cBhvr>
+                                    </p:animEffect>
+                                  </p:childTnLst>
+                                </p:cTn>
+                              </p:par>
+                            </p:childTnLst>
+                          </p:cTn>
+                        </p:par>
+                      </p:childTnLst>
+                    </p:cTn>
+                  </p:par>
+                  <p:par>
+                    <p:cTn id="18" fill="hold">
+                      <p:stCondLst>
+                        <p:cond delay="indefinite"/>
+                      </p:stCondLst>
+                      <p:childTnLst>
+                        <p:par>
+                          <p:cTn id="19" fill="hold">
+                            <p:stCondLst>
+                              <p:cond delay="0"/>
+                            </p:stCondLst>
+                            <p:childTnLst>
+                              <p:par>
+                                <p:cTn id="20" presetID="10" presetClass="entr" presetSubtype="0" fill="hold" nodeType="clickEffect">
+                                  <p:stCondLst>
+                                    <p:cond delay="0"/>
+                                  </p:stCondLst>
+                                  <p:childTnLst>
+                                    <p:set>
+                                      <p:cBhvr>
+                                        <p:cTn id="21" dur="1" fill="hold">
+                                          <p:stCondLst>
+                                            <p:cond delay="0"/>
+                                          </p:stCondLst>
+                                        </p:cTn>
+                                        <p:tgtEl>
+                                          <p:spTgt spid="100"/>
+                                        </p:tgtEl>
+                                        <p:attrNameLst>
+                                          <p:attrName>style.visibility</p:attrName>
+                                        </p:attrNameLst>
+                                      </p:cBhvr>
+                                      <p:to>
+                                        <p:strVal val="visible"/>
+                                      </p:to>
+                                    </p:set>
+                                    <p:animEffect transition="in" filter="fade">
+                                      <p:cBhvr>
+                                        <p:cTn id="22" dur="500"/>
+                                        <p:tgtEl>
+                                          <p:spTgt spid="100"/>
+                                        </p:tgtEl>
+                                      </p:cBhvr>
+                                    </p:animEffect>
+                                  </p:childTnLst>
+                                </p:cTn>
+                              </p:par>
+                            </p:childTnLst>
+                          </p:cTn>
+                        </p:par>
+                      </p:childTnLst>
+                    </p:cTn>
+                  </p:par>
+                  <p:par>
+                    <p:cTn id="23" fill="hold">
+                      <p:stCondLst>
+                        <p:cond delay="indefinite"/>
+                      </p:stCondLst>
+                      <p:childTnLst>
+                        <p:par>
+                          <p:cTn id="24" fill="hold">
+                            <p:stCondLst>
+                              <p:cond delay="0"/>
+                            </p:stCondLst>
+                            <p:childTnLst>
+                              <p:par>
+                                <p:cTn id="25" presetID="10" presetClass="entr" presetSubtype="0" fill="hold" nodeType="clickEffect">
+                                  <p:stCondLst>
+                                    <p:cond delay="0"/>
+                                  </p:stCondLst>
+                                  <p:childTnLst>
+                                    <p:set>
+                                      <p:cBhvr>
+                                        <p:cTn id="26" dur="1" fill="hold">
+                                          <p:stCondLst>
+                                            <p:cond delay="0"/>
+                                          </p:stCondLst>
+                                        </p:cTn>
+                                        <p:tgtEl>
+                                          <p:spTgt spid="44"/>
+                                        </p:tgtEl>
+                                        <p:attrNameLst>
+                                          <p:attrName>style.visibility</p:attrName>
+                                        </p:attrNameLst>
+                                      </p:cBhvr>
+                                      <p:to>
+                                        <p:strVal val="visible"/>
+                                      </p:to>
+                                    </p:set>
+                                    <p:animEffect transition="in" filter="fade">
+                                      <p:cBhvr>
+                                        <p:cTn id="27" dur="500"/>
+                                        <p:tgtEl>
+                                          <p:spTgt spid="44"/>
+                                        </p:tgtEl>
+                                      </p:cBhvr>
+                                    </p:animEffect>
+                                  </p:childTnLst>
+                                </p:cTn>
+                              </p:par>
+                            </p:childTnLst>
+                          </p:cTn>
+                        </p:par>
+                      </p:childTnLst>
+                    </p:cTn>
+                  </p:par>
+                  <p:par>
+                    <p:cTn id="28" fill="hold">
+                      <p:stCondLst>
+                        <p:cond delay="indefinite"/>
+                      </p:stCondLst>
+                      <p:childTnLst>
+                        <p:par>
+                          <p:cTn id="29" fill="hold">
+                            <p:stCondLst>
+                              <p:cond delay="0"/>
+                            </p:stCondLst>
+                            <p:childTnLst>
+                              <p:par>
+                                <p:cTn id="30" presetID="10" presetClass="entr" presetSubtype="0" fill="hold" grpId="0" nodeType="clickEffect">
+                                  <p:stCondLst>
+                                    <p:cond delay="0"/>
+                                  </p:stCondLst>
+                                  <p:childTnLst>
+                                    <p:set>
+                                      <p:cBhvr>
+                                        <p:cTn id="31" dur="1" fill="hold">
+                                          <p:stCondLst>
+                                            <p:cond delay="0"/>
+                                          </p:stCondLst>
+                                        </p:cTn>
+                                        <p:tgtEl>
+                                          <p:spTgt spid="87"/>
+                                        </p:tgtEl>
+                                        <p:attrNameLst>
+                                          <p:attrName>style.visibility</p:attrName>
+                                        </p:attrNameLst>
+                                      </p:cBhvr>
+                                      <p:to>
+                                        <p:strVal val="visible"/>
+                                      </p:to>
+                                    </p:set>
+                                    <p:animEffect transition="in" filter="fade">
+                                      <p:cBhvr>
+                                        <p:cTn id="32" dur="500"/>
+                                        <p:tgtEl>
+                                          <p:spTgt spid="87"/>
+                                        </p:tgtEl>
+                                      </p:cBhvr>
+                                    </p:animEffect>
+                                  </p:childTnLst>
+                                </p:cTn>
+                              </p:par>
+                            </p:childTnLst>
+                          </p:cTn>
+                        </p:par>
+                      </p:childTnLst>
+                    </p:cTn>
+                  </p:par>
+                  <p:par>
+                    <p:cTn id="33" fill="hold">
+                      <p:stCondLst>
+                        <p:cond delay="indefinite"/>
+                      </p:stCondLst>
+                      <p:childTnLst>
+                        <p:par>
+                          <p:cTn id="34" fill="hold">
+                            <p:stCondLst>
+                              <p:cond delay="0"/>
+                            </p:stCondLst>
+                            <p:childTnLst>
+                              <p:par>
+                                <p:cTn id="35" presetID="10" presetClass="entr" presetSubtype="0" fill="hold" nodeType="clickEffect">
+                                  <p:stCondLst>
+                                    <p:cond delay="0"/>
+                                  </p:stCondLst>
+                                  <p:childTnLst>
+                                    <p:set>
+                                      <p:cBhvr>
+                                        <p:cTn id="36" dur="1" fill="hold">
+                                          <p:stCondLst>
+                                            <p:cond delay="0"/>
+                                          </p:stCondLst>
+                                        </p:cTn>
+                                        <p:tgtEl>
+                                          <p:spTgt spid="101"/>
+                                        </p:tgtEl>
+                                        <p:attrNameLst>
+                                          <p:attrName>style.visibility</p:attrName>
+                                        </p:attrNameLst>
+                                      </p:cBhvr>
+                                      <p:to>
+                                        <p:strVal val="visible"/>
+                                      </p:to>
+                                    </p:set>
+                                    <p:animEffect transition="in" filter="fade">
+                                      <p:cBhvr>
+                                        <p:cTn id="37" dur="500"/>
+                                        <p:tgtEl>
+                                          <p:spTgt spid="101"/>
+                                        </p:tgtEl>
+                                      </p:cBhvr>
+                                    </p:animEffect>
+                                  </p:childTnLst>
+                                </p:cTn>
+                              </p:par>
+                            </p:childTnLst>
+                          </p:cTn>
+                        </p:par>
+                      </p:childTnLst>
+                    </p:cTn>
+                  </p:par>
+                  <p:par>
+                    <p:cTn id="38" fill="hold">
+                      <p:stCondLst>
+                        <p:cond delay="indefinite"/>
+                      </p:stCondLst>
+                      <p:childTnLst>
+                        <p:par>
+                          <p:cTn id="39" fill="hold">
+                            <p:stCondLst>
+                              <p:cond delay="0"/>
+                            </p:stCondLst>
+                            <p:childTnLst>
+                              <p:par>
+                                <p:cTn id="40" presetID="10" presetClass="entr" presetSubtype="0" fill="hold" nodeType="clickEffect">
+                                  <p:stCondLst>
+                                    <p:cond delay="0"/>
+                                  </p:stCondLst>
+                                  <p:childTnLst>
+                                    <p:set>
+                                      <p:cBhvr>
+                                        <p:cTn id="41" dur="1" fill="hold">
+                                          <p:stCondLst>
+                                            <p:cond delay="0"/>
+                                          </p:stCondLst>
+                                        </p:cTn>
+                                        <p:tgtEl>
+                                          <p:spTgt spid="45"/>
+                                        </p:tgtEl>
+                                        <p:attrNameLst>
+                                          <p:attrName>style.visibility</p:attrName>
+                                        </p:attrNameLst>
+                                      </p:cBhvr>
+                                      <p:to>
+                                        <p:strVal val="visible"/>
+                                      </p:to>
+                                    </p:set>
+                                    <p:animEffect transition="in" filter="fade">
+                                      <p:cBhvr>
+                                        <p:cTn id="42" dur="500"/>
+                                        <p:tgtEl>
+                                          <p:spTgt spid="45"/>
+                                        </p:tgtEl>
+                                      </p:cBhvr>
+                                    </p:animEffect>
+                                  </p:childTnLst>
+                                </p:cTn>
+                              </p:par>
+                            </p:childTnLst>
+                          </p:cTn>
+                        </p:par>
+                      </p:childTnLst>
+                    </p:cTn>
+                  </p:par>
+                  <p:par>
+                    <p:cTn id="43" fill="hold">
+                      <p:stCondLst>
+                        <p:cond delay="indefinite"/>
+                      </p:stCondLst>
+                      <p:childTnLst>
+                        <p:par>
+                          <p:cTn id="44" fill="hold">
+                            <p:stCondLst>
+                              <p:cond delay="0"/>
+                            </p:stCondLst>
+                            <p:childTnLst>
+                              <p:par>
+                                <p:cTn id="45" presetID="10" presetClass="entr" presetSubtype="0" fill="hold" grpId="0" nodeType="clickEffect">
+                                  <p:stCondLst>
+                                    <p:cond delay="0"/>
+                                  </p:stCondLst>
+                                  <p:childTnLst>
+                                    <p:set>
+                                      <p:cBhvr>
+                                        <p:cTn id="46" dur="1" fill="hold">
+                                          <p:stCondLst>
+                                            <p:cond delay="0"/>
+                                          </p:stCondLst>
+                                        </p:cTn>
+                                        <p:tgtEl>
+                                          <p:spTgt spid="88"/>
+                                        </p:tgtEl>
+                                        <p:attrNameLst>
+                                          <p:attrName>style.visibility</p:attrName>
+                                        </p:attrNameLst>
+                                      </p:cBhvr>
+                                      <p:to>
+                                        <p:strVal val="visible"/>
+                                      </p:to>
+                                    </p:set>
+                                    <p:animEffect transition="in" filter="fade">
+                                      <p:cBhvr>
+                                        <p:cTn id="47" dur="500"/>
+                                        <p:tgtEl>
+                                          <p:spTgt spid="88"/>
+                                        </p:tgtEl>
+                                      </p:cBhvr>
+                                    </p:animEffect>
+                                  </p:childTnLst>
+                                </p:cTn>
+                              </p:par>
+                            </p:childTnLst>
+                          </p:cTn>
+                        </p:par>
+                      </p:childTnLst>
+                    </p:cTn>
+                  </p:par>
+                  <p:par>
+                    <p:cTn id="48" fill="hold">
+                      <p:stCondLst>
+                        <p:cond delay="indefinite"/>
+                      </p:stCondLst>
+                      <p:childTnLst>
+                        <p:par>
+                          <p:cTn id="49" fill="hold">
+                            <p:stCondLst>
+                              <p:cond delay="0"/>
+                            </p:stCondLst>
+                            <p:childTnLst>
+                              <p:par>
+                                <p:cTn id="50" presetID="10" presetClass="entr" presetSubtype="0" fill="hold" nodeType="clickEffect">
+                                  <p:stCondLst>
+                                    <p:cond delay="0"/>
+                                  </p:stCondLst>
+                                  <p:childTnLst>
+                                    <p:set>
+                                      <p:cBhvr>
+                                        <p:cTn id="51" dur="1" fill="hold">
+                                          <p:stCondLst>
+                                            <p:cond delay="0"/>
+                                          </p:stCondLst>
+                                        </p:cTn>
+                                        <p:tgtEl>
+                                          <p:spTgt spid="102"/>
+                                        </p:tgtEl>
+                                        <p:attrNameLst>
+                                          <p:attrName>style.visibility</p:attrName>
+                                        </p:attrNameLst>
+                                      </p:cBhvr>
+                                      <p:to>
+                                        <p:strVal val="visible"/>
+                                      </p:to>
+                                    </p:set>
+                                    <p:animEffect transition="in" filter="fade">
+                                      <p:cBhvr>
+                                        <p:cTn id="52" dur="500"/>
+                                        <p:tgtEl>
+                                          <p:spTgt spid="102"/>
+                                        </p:tgtEl>
+                                      </p:cBhvr>
+                                    </p:animEffect>
+                                  </p:childTnLst>
+                                </p:cTn>
+                              </p:par>
+                            </p:childTnLst>
+                          </p:cTn>
+                        </p:par>
+                      </p:childTnLst>
+                    </p:cTn>
+                  </p:par>
+                  <p:par>
+                    <p:cTn id="53" fill="hold">
+                      <p:stCondLst>
+                        <p:cond delay="indefinite"/>
+                      </p:stCondLst>
+                      <p:childTnLst>
+                        <p:par>
+                          <p:cTn id="54" fill="hold">
+                            <p:stCondLst>
+                              <p:cond delay="0"/>
+                            </p:stCondLst>
+                            <p:childTnLst>
+                              <p:par>
+                                <p:cTn id="55" presetID="10" presetClass="entr" presetSubtype="0" fill="hold" nodeType="clickEffect">
+                                  <p:stCondLst>
+                                    <p:cond delay="0"/>
+                                  </p:stCondLst>
+                                  <p:childTnLst>
+                                    <p:set>
+                                      <p:cBhvr>
+                                        <p:cTn id="56" dur="1" fill="hold">
+                                          <p:stCondLst>
+                                            <p:cond delay="0"/>
+                                          </p:stCondLst>
+                                        </p:cTn>
+                                        <p:tgtEl>
+                                          <p:spTgt spid="46"/>
+                                        </p:tgtEl>
+                                        <p:attrNameLst>
+                                          <p:attrName>style.visibility</p:attrName>
+                                        </p:attrNameLst>
+                                      </p:cBhvr>
+                                      <p:to>
+                                        <p:strVal val="visible"/>
+                                      </p:to>
+                                    </p:set>
+                                    <p:animEffect transition="in" filter="fade">
+                                      <p:cBhvr>
+                                        <p:cTn id="57" dur="500"/>
+                                        <p:tgtEl>
+                                          <p:spTgt spid="46"/>
+                                        </p:tgtEl>
+                                      </p:cBhvr>
+                                    </p:animEffect>
+                                  </p:childTnLst>
+                                </p:cTn>
+                              </p:par>
+                            </p:childTnLst>
+                          </p:cTn>
+                        </p:par>
+                      </p:childTnLst>
+                    </p:cTn>
+                  </p:par>
+                  <p:par>
+                    <p:cTn id="58" fill="hold">
+                      <p:stCondLst>
+                        <p:cond delay="indefinite"/>
+                      </p:stCondLst>
+                      <p:childTnLst>
+                        <p:par>
+                          <p:cTn id="59" fill="hold">
+                            <p:stCondLst>
+                              <p:cond delay="0"/>
+                            </p:stCondLst>
+                            <p:childTnLst>
+                              <p:par>
+                                <p:cTn id="60" presetID="10" presetClass="entr" presetSubtype="0" fill="hold" grpId="0" nodeType="clickEffect">
+                                  <p:stCondLst>
+                                    <p:cond delay="0"/>
+                                  </p:stCondLst>
+                                  <p:childTnLst>
+                                    <p:set>
+                                      <p:cBhvr>
+                                        <p:cTn id="61" dur="1" fill="hold">
+                                          <p:stCondLst>
+                                            <p:cond delay="0"/>
+                                          </p:stCondLst>
+                                        </p:cTn>
+                                        <p:tgtEl>
+                                          <p:spTgt spid="89"/>
+                                        </p:tgtEl>
+                                        <p:attrNameLst>
+                                          <p:attrName>style.visibility</p:attrName>
+                                        </p:attrNameLst>
+                                      </p:cBhvr>
+                                      <p:to>
+                                        <p:strVal val="visible"/>
+                                      </p:to>
+                                    </p:set>
+                                    <p:animEffect transition="in" filter="fade">
+                                      <p:cBhvr>
+                                        <p:cTn id="62" dur="500"/>
+                                        <p:tgtEl>
+                                          <p:spTgt spid="89"/>
+                                        </p:tgtEl>
+                                      </p:cBhvr>
+                                    </p:animEffect>
+                                  </p:childTnLst>
+                                </p:cTn>
+                              </p:par>
+                            </p:childTnLst>
+                          </p:cTn>
+                        </p:par>
+                      </p:childTnLst>
+                    </p:cTn>
+                  </p:par>
+                  <p:par>
+                    <p:cTn id="63" fill="hold">
+                      <p:stCondLst>
+                        <p:cond delay="indefinite"/>
+                      </p:stCondLst>
+                      <p:childTnLst>
+                        <p:par>
+                          <p:cTn id="64" fill="hold">
+                            <p:stCondLst>
+                              <p:cond delay="0"/>
+                            </p:stCondLst>
+                            <p:childTnLst>
+                              <p:par>
+                                <p:cTn id="65" presetID="10" presetClass="entr" presetSubtype="0" fill="hold" nodeType="clickEffect">
+                                  <p:stCondLst>
+                                    <p:cond delay="0"/>
+                                  </p:stCondLst>
+                                  <p:childTnLst>
+                                    <p:set>
+                                      <p:cBhvr>
+                                        <p:cTn id="66" dur="1" fill="hold">
+                                          <p:stCondLst>
+                                            <p:cond delay="0"/>
+                                          </p:stCondLst>
+                                        </p:cTn>
+                                        <p:tgtEl>
+                                          <p:spTgt spid="103"/>
+                                        </p:tgtEl>
+                                        <p:attrNameLst>
+                                          <p:attrName>style.visibility</p:attrName>
+                                        </p:attrNameLst>
+                                      </p:cBhvr>
+                                      <p:to>
+                                        <p:strVal val="visible"/>
+                                      </p:to>
+                                    </p:set>
+                                    <p:animEffect transition="in" filter="fade">
+                                      <p:cBhvr>
+                                        <p:cTn id="67" dur="500"/>
+                                        <p:tgtEl>
+                                          <p:spTgt spid="103"/>
+                                        </p:tgtEl>
+                                      </p:cBhvr>
+                                    </p:animEffect>
+                                  </p:childTnLst>
+                                </p:cTn>
+                              </p:par>
+                            </p:childTnLst>
+                          </p:cTn>
+                        </p:par>
+                      </p:childTnLst>
+                    </p:cTn>
+                  </p:par>
+                  <p:par>
+                    <p:cTn id="68" fill="hold">
+                      <p:stCondLst>
+                        <p:cond delay="indefinite"/>
+                      </p:stCondLst>
+                      <p:childTnLst>
+                        <p:par>
+                          <p:cTn id="69" fill="hold">
+                            <p:stCondLst>
+                              <p:cond delay="0"/>
+                            </p:stCondLst>
+                            <p:childTnLst>
+                              <p:par>
+                                <p:cTn id="70" presetID="10" presetClass="entr" presetSubtype="0" fill="hold" nodeType="clickEffect">
+                                  <p:stCondLst>
+                                    <p:cond delay="0"/>
+                                  </p:stCondLst>
+                                  <p:childTnLst>
+                                    <p:set>
+                                      <p:cBhvr>
+                                        <p:cTn id="71" dur="1" fill="hold">
+                                          <p:stCondLst>
+                                            <p:cond delay="0"/>
+                                          </p:stCondLst>
+                                        </p:cTn>
+                                        <p:tgtEl>
+                                          <p:spTgt spid="47"/>
+                                        </p:tgtEl>
+                                        <p:attrNameLst>
+                                          <p:attrName>style.visibility</p:attrName>
+                                        </p:attrNameLst>
+                                      </p:cBhvr>
+                                      <p:to>
+                                        <p:strVal val="visible"/>
+                                      </p:to>
+                                    </p:set>
+                                    <p:animEffect transition="in" filter="fade">
+                                      <p:cBhvr>
+                                        <p:cTn id="72" dur="500"/>
+                                        <p:tgtEl>
+                                          <p:spTgt spid="47"/>
+                                        </p:tgtEl>
+                                      </p:cBhvr>
+                                    </p:animEffect>
+                                  </p:childTnLst>
+                                </p:cTn>
+                              </p:par>
+                            </p:childTnLst>
+                          </p:cTn>
+                        </p:par>
+                      </p:childTnLst>
+                    </p:cTn>
+                  </p:par>
+                  <p:par>
+                    <p:cTn id="73" fill="hold">
+                      <p:stCondLst>
+                        <p:cond delay="indefinite"/>
+                      </p:stCondLst>
+                      <p:childTnLst>
+                        <p:par>
+                          <p:cTn id="74" fill="hold">
+                            <p:stCondLst>
+                              <p:cond delay="0"/>
+                            </p:stCondLst>
+                            <p:childTnLst>
+                              <p:par>
+                                <p:cTn id="75" presetID="10" presetClass="entr" presetSubtype="0" fill="hold" grpId="0" nodeType="clickEffect">
+                                  <p:stCondLst>
+                                    <p:cond delay="0"/>
+                                  </p:stCondLst>
+                                  <p:childTnLst>
+                                    <p:set>
+                                      <p:cBhvr>
+                                        <p:cTn id="76" dur="1" fill="hold">
+                                          <p:stCondLst>
+                                            <p:cond delay="0"/>
+                                          </p:stCondLst>
+                                        </p:cTn>
+                                        <p:tgtEl>
+                                          <p:spTgt spid="90"/>
+                                        </p:tgtEl>
+                                        <p:attrNameLst>
+                                          <p:attrName>style.visibility</p:attrName>
+                                        </p:attrNameLst>
+                                      </p:cBhvr>
+                                      <p:to>
+                                        <p:strVal val="visible"/>
+                                      </p:to>
+                                    </p:set>
+                                    <p:animEffect transition="in" filter="fade">
+                                      <p:cBhvr>
+                                        <p:cTn id="77" dur="500"/>
+                                        <p:tgtEl>
+                                          <p:spTgt spid="90"/>
+                                        </p:tgtEl>
+                                      </p:cBhvr>
+                                    </p:animEffect>
+                                  </p:childTnLst>
+                                </p:cTn>
+                              </p:par>
+                            </p:childTnLst>
+                          </p:cTn>
+                        </p:par>
+                      </p:childTnLst>
+                    </p:cTn>
+                  </p:par>
+                  <p:par>
+                    <p:cTn id="78" fill="hold">
+                      <p:stCondLst>
+                        <p:cond delay="indefinite"/>
+                      </p:stCondLst>
+                      <p:childTnLst>
+                        <p:par>
+                          <p:cTn id="79" fill="hold">
+                            <p:stCondLst>
+                              <p:cond delay="0"/>
+                            </p:stCondLst>
+                            <p:childTnLst>
+                              <p:par>
+                                <p:cTn id="80" presetID="10" presetClass="entr" presetSubtype="0" fill="hold" nodeType="clickEffect">
+                                  <p:stCondLst>
+                                    <p:cond delay="0"/>
+                                  </p:stCondLst>
+                                  <p:childTnLst>
+                                    <p:set>
+                                      <p:cBhvr>
+                                        <p:cTn id="81" dur="1" fill="hold">
+                                          <p:stCondLst>
+                                            <p:cond delay="0"/>
+                                          </p:stCondLst>
+                                        </p:cTn>
+                                        <p:tgtEl>
+                                          <p:spTgt spid="104"/>
+                                        </p:tgtEl>
+                                        <p:attrNameLst>
+                                          <p:attrName>style.visibility</p:attrName>
+                                        </p:attrNameLst>
+                                      </p:cBhvr>
+                                      <p:to>
+                                        <p:strVal val="visible"/>
+                                      </p:to>
+                                    </p:set>
+                                    <p:animEffect transition="in" filter="fade">
+                                      <p:cBhvr>
+                                        <p:cTn id="82" dur="500"/>
+                                        <p:tgtEl>
+                                          <p:spTgt spid="104"/>
+                                        </p:tgtEl>
+                                      </p:cBhvr>
+                                    </p:animEffect>
+                                  </p:childTnLst>
+                                </p:cTn>
+                              </p:par>
+                            </p:childTnLst>
+                          </p:cTn>
+                        </p:par>
+                      </p:childTnLst>
+                    </p:cTn>
+                  </p:par>
+                  <p:par>
+                    <p:cTn id="83" fill="hold">
+                      <p:stCondLst>
+                        <p:cond delay="indefinite"/>
+                      </p:stCondLst>
+                      <p:childTnLst>
+                        <p:par>
+                          <p:cTn id="84" fill="hold">
+                            <p:stCondLst>
+                              <p:cond delay="0"/>
+                            </p:stCondLst>
+                            <p:childTnLst>
+                              <p:par>
+                                <p:cTn id="85" presetID="10" presetClass="entr" presetSubtype="0" fill="hold" nodeType="clickEffect">
+                                  <p:stCondLst>
+                                    <p:cond delay="0"/>
+                                  </p:stCondLst>
+                                  <p:childTnLst>
+                                    <p:set>
+                                      <p:cBhvr>
+                                        <p:cTn id="86" dur="1" fill="hold">
+                                          <p:stCondLst>
+                                            <p:cond delay="0"/>
+                                          </p:stCondLst>
+                                        </p:cTn>
+                                        <p:tgtEl>
+                                          <p:spTgt spid="48"/>
+                                        </p:tgtEl>
+                                        <p:attrNameLst>
+                                          <p:attrName>style.visibility</p:attrName>
+                                        </p:attrNameLst>
+                                      </p:cBhvr>
+                                      <p:to>
+                                        <p:strVal val="visible"/>
+                                      </p:to>
+                                    </p:set>
+                                    <p:animEffect transition="in" filter="fade">
+                                      <p:cBhvr>
+                                        <p:cTn id="87" dur="500"/>
+                                        <p:tgtEl>
+                                          <p:spTgt spid="48"/>
+                                        </p:tgtEl>
+                                      </p:cBhvr>
+                                    </p:animEffect>
+                                  </p:childTnLst>
+                                </p:cTn>
+                              </p:par>
+                            </p:childTnLst>
+                          </p:cTn>
+                        </p:par>
+                      </p:childTnLst>
+                    </p:cTn>
+                  </p:par>
+                  <p:par>
+                    <p:cTn id="88" fill="hold">
+                      <p:stCondLst>
+                        <p:cond delay="indefinite"/>
+                      </p:stCondLst>
+                      <p:childTnLst>
+                        <p:par>
+                          <p:cTn id="89" fill="hold">
+                            <p:stCondLst>
+                              <p:cond delay="0"/>
+                            </p:stCondLst>
+                            <p:childTnLst>
+                              <p:par>
+                                <p:cTn id="90" presetID="10" presetClass="entr" presetSubtype="0" fill="hold" grpId="0" nodeType="clickEffect">
+                                  <p:stCondLst>
+                                    <p:cond delay="0"/>
+                                  </p:stCondLst>
+                                  <p:childTnLst>
+                                    <p:set>
+                                      <p:cBhvr>
+                                        <p:cTn id="91" dur="1" fill="hold">
+                                          <p:stCondLst>
+                                            <p:cond delay="0"/>
+                                          </p:stCondLst>
+                                        </p:cTn>
+                                        <p:tgtEl>
+                                          <p:spTgt spid="91"/>
+                                        </p:tgtEl>
+                                        <p:attrNameLst>
+                                          <p:attrName>style.visibility</p:attrName>
+                                        </p:attrNameLst>
+                                      </p:cBhvr>
+                                      <p:to>
+                                        <p:strVal val="visible"/>
+                                      </p:to>
+                                    </p:set>
+                                    <p:animEffect transition="in" filter="fade">
+                                      <p:cBhvr>
+                                        <p:cTn id="92" dur="500"/>
+                                        <p:tgtEl>
+                                          <p:spTgt spid="91"/>
+                                        </p:tgtEl>
+                                      </p:cBhvr>
+                                    </p:animEffect>
+                                  </p:childTnLst>
+                                </p:cTn>
+                              </p:par>
+                            </p:childTnLst>
+                          </p:cTn>
+                        </p:par>
+                      </p:childTnLst>
+                    </p:cTn>
+                  </p:par>
+                  <p:par>
+                    <p:cTn id="93" fill="hold">
+                      <p:stCondLst>
+                        <p:cond delay="indefinite"/>
+                      </p:stCondLst>
+                      <p:childTnLst>
+                        <p:par>
+                          <p:cTn id="94" fill="hold">
+                            <p:stCondLst>
+                              <p:cond delay="0"/>
+                            </p:stCondLst>
+                            <p:childTnLst>
+                              <p:par>
+                                <p:cTn id="95" presetID="10" presetClass="entr" presetSubtype="0" fill="hold" nodeType="clickEffect">
+                                  <p:stCondLst>
+                                    <p:cond delay="0"/>
+                                  </p:stCondLst>
+                                  <p:childTnLst>
+                                    <p:set>
+                                      <p:cBhvr>
+                                        <p:cTn id="96" dur="1" fill="hold">
+                                          <p:stCondLst>
+                                            <p:cond delay="0"/>
+                                          </p:stCondLst>
+                                        </p:cTn>
+                                        <p:tgtEl>
+                                          <p:spTgt spid="105"/>
+                                        </p:tgtEl>
+                                        <p:attrNameLst>
+                                          <p:attrName>style.visibility</p:attrName>
+                                        </p:attrNameLst>
+                                      </p:cBhvr>
+                                      <p:to>
+                                        <p:strVal val="visible"/>
+                                      </p:to>
+                                    </p:set>
+                                    <p:animEffect transition="in" filter="fade">
+                                      <p:cBhvr>
+                                        <p:cTn id="97" dur="500"/>
+                                        <p:tgtEl>
+                                          <p:spTgt spid="105"/>
+                                        </p:tgtEl>
+                                      </p:cBhvr>
+                                    </p:animEffect>
+                                  </p:childTnLst>
+                                </p:cTn>
+                              </p:par>
+                            </p:childTnLst>
+                          </p:cTn>
+                        </p:par>
+                      </p:childTnLst>
+                    </p:cTn>
+                  </p:par>
+                  <p:par>
+                    <p:cTn id="98" fill="hold">
+                      <p:stCondLst>
+                        <p:cond delay="indefinite"/>
+                      </p:stCondLst>
+                      <p:childTnLst>
+                        <p:par>
+                          <p:cTn id="99" fill="hold">
+                            <p:stCondLst>
+                              <p:cond delay="0"/>
+                            </p:stCondLst>
+                            <p:childTnLst>
+                              <p:par>
+                                <p:cTn id="100" presetID="10" presetClass="entr" presetSubtype="0" fill="hold" nodeType="clickEffect">
+                                  <p:stCondLst>
+                                    <p:cond delay="0"/>
+                                  </p:stCondLst>
+                                  <p:childTnLst>
+                                    <p:set>
+                                      <p:cBhvr>
+                                        <p:cTn id="101" dur="1" fill="hold">
+                                          <p:stCondLst>
+                                            <p:cond delay="0"/>
+                                          </p:stCondLst>
+                                        </p:cTn>
+                                        <p:tgtEl>
+                                          <p:spTgt spid="106"/>
+                                        </p:tgtEl>
+                                        <p:attrNameLst>
+                                          <p:attrName>style.visibility</p:attrName>
+                                        </p:attrNameLst>
+                                      </p:cBhvr>
+                                      <p:to>
+                                        <p:strVal val="visible"/>
+                                      </p:to>
+                                    </p:set>
+                                    <p:animEffect transition="in" filter="fade">
+                                      <p:cBhvr>
+                                        <p:cTn id="102" dur="500"/>
+                                        <p:tgtEl>
+                                          <p:spTgt spid="106"/>
+                                        </p:tgtEl>
+                                      </p:cBhvr>
+                                    </p:animEffect>
+                                  </p:childTnLst>
+                                </p:cTn>
+                              </p:par>
+                            </p:childTnLst>
+                          </p:cTn>
+                        </p:par>
+                      </p:childTnLst>
+                    </p:cTn>
+                  </p:par>
+                  <p:par>
+                    <p:cTn id="103" fill="hold">
+                      <p:stCondLst>
+                        <p:cond delay="indefinite"/>
+                      </p:stCondLst>
+                      <p:childTnLst>
+                        <p:par>
+                          <p:cTn id="104" fill="hold">
+                            <p:stCondLst>
+                              <p:cond delay="0"/>
+                            </p:stCondLst>
+                            <p:childTnLst>
+                              <p:par>
+                                <p:cTn id="105" presetID="10" presetClass="entr" presetSubtype="0" fill="hold" nodeType="clickEffect">
+                                  <p:stCondLst>
+                                    <p:cond delay="0"/>
+                                  </p:stCondLst>
+                                  <p:childTnLst>
+                                    <p:set>
+                                      <p:cBhvr>
+                                        <p:cTn id="106" dur="1" fill="hold">
+                                          <p:stCondLst>
+                                            <p:cond delay="0"/>
+                                          </p:stCondLst>
+                                        </p:cTn>
+                                        <p:tgtEl>
+                                          <p:spTgt spid="108"/>
+                                        </p:tgtEl>
+                                        <p:attrNameLst>
+                                          <p:attrName>style.visibility</p:attrName>
+                                        </p:attrNameLst>
+                                      </p:cBhvr>
+                                      <p:to>
+                                        <p:strVal val="visible"/>
+                                      </p:to>
+                                    </p:set>
+                                    <p:animEffect transition="in" filter="fade">
+                                      <p:cBhvr>
+                                        <p:cTn id="107" dur="500"/>
+                                        <p:tgtEl>
+                                          <p:spTgt spid="108"/>
+                                        </p:tgtEl>
+                                      </p:cBhvr>
+                                    </p:animEffect>
+                                  </p:childTnLst>
+                                </p:cTn>
+                              </p:par>
+                            </p:childTnLst>
+                          </p:cTn>
+                        </p:par>
+                      </p:childTnLst>
+                    </p:cTn>
+                  </p:par>
+                </p:childTnLst>
+              </p:cTn>
+              <p:prevCondLst>
+                <p:cond evt="onPrev" delay="0">
+                  <p:tgtEl>
+                    <p:sldTgt/>
+                  </p:tgtEl>
+                </p:cond>
+              </p:prevCondLst>
+              <p:nextCondLst>
+                <p:cond evt="onNext" delay="0">
+                  <p:tgtEl>
+                    <p:sldTgt/>
+                  </p:tgtEl>
+                </p:cond>
+              </p:nextCondLst>
+            </p:seq>
+          </p:childTnLst>
+        </p:cTn>
+      </p:par>
+    </p:tnLst>
+    <p:bldLst>
+      <p:bldP spid="87" grpId="0" animBg="1"/>
+      <p:bldP spid="88" grpId="0" animBg="1"/>
+      <p:bldP spid="89" grpId="0" animBg="1"/>
+      <p:bldP spid="90" grpId="0" animBg="1"/>
+      <p:bldP spid="91" grpId="0" animBg="1"/>
+      <p:bldP spid="7" grpId="0" animBg="1"/>
+    </p:bldLst>
+  </p:timing>
+</p:sld>
+</file>
+
+<file path=ppt/slides/slide5.xml><?xml version="1.0" encoding="utf-8"?>
 <p:sld xmlns:a="http://schemas.openxmlformats.org/drawingml/2006/main" xmlns:r="http://schemas.openxmlformats.org/officeDocument/2006/relationships" xmlns:p="http://schemas.openxmlformats.org/presentationml/2006/main">
   <p:cSld>
     <p:spTree>
@@ -3245,10 +6930,17 @@
   <p:clrMapOvr>
     <a:masterClrMapping/>
   </p:clrMapOvr>
+  <p:timing>
+    <p:tnLst>
+      <p:par>
+        <p:cTn id="1" dur="indefinite" restart="never" nodeType="tmRoot"/>
+      </p:par>
+    </p:tnLst>
+  </p:timing>
 </p:sld>
 </file>
 
-<file path=ppt/slides/slide5.xml><?xml version="1.0" encoding="utf-8"?>
+<file path=ppt/slides/slide6.xml><?xml version="1.0" encoding="utf-8"?>
 <p:sld xmlns:a="http://schemas.openxmlformats.org/drawingml/2006/main" xmlns:r="http://schemas.openxmlformats.org/officeDocument/2006/relationships" xmlns:p="http://schemas.openxmlformats.org/presentationml/2006/main">
   <p:cSld>
     <p:spTree>
@@ -3305,10 +6997,17 @@
   <p:clrMapOvr>
     <a:masterClrMapping/>
   </p:clrMapOvr>
+  <p:timing>
+    <p:tnLst>
+      <p:par>
+        <p:cTn id="1" dur="indefinite" restart="never" nodeType="tmRoot"/>
+      </p:par>
+    </p:tnLst>
+  </p:timing>
 </p:sld>
 </file>
 
-<file path=ppt/slides/slide6.xml><?xml version="1.0" encoding="utf-8"?>
+<file path=ppt/slides/slide7.xml><?xml version="1.0" encoding="utf-8"?>
 <p:sld xmlns:a="http://schemas.openxmlformats.org/drawingml/2006/main" xmlns:r="http://schemas.openxmlformats.org/officeDocument/2006/relationships" xmlns:p="http://schemas.openxmlformats.org/presentationml/2006/main">
   <p:cSld>
     <p:spTree>

</xml_diff>